<commit_message>
New version of assogw-v1
</commit_message>
<xml_diff>
--- a/design/assogw-v1.pptx
+++ b/design/assogw-v1.pptx
@@ -5,15 +5,21 @@
     <p:sldMasterId id="2147483660" r:id="rId4"/>
   </p:sldMasterIdLst>
   <p:notesMasterIdLst>
-    <p:notesMasterId r:id="rId8"/>
+    <p:notesMasterId r:id="rId14"/>
   </p:notesMasterIdLst>
   <p:handoutMasterIdLst>
-    <p:handoutMasterId r:id="rId9"/>
+    <p:handoutMasterId r:id="rId15"/>
   </p:handoutMasterIdLst>
   <p:sldIdLst>
     <p:sldId id="280" r:id="rId5"/>
-    <p:sldId id="282" r:id="rId6"/>
-    <p:sldId id="283" r:id="rId7"/>
+    <p:sldId id="294" r:id="rId6"/>
+    <p:sldId id="286" r:id="rId7"/>
+    <p:sldId id="289" r:id="rId8"/>
+    <p:sldId id="290" r:id="rId9"/>
+    <p:sldId id="291" r:id="rId10"/>
+    <p:sldId id="292" r:id="rId11"/>
+    <p:sldId id="293" r:id="rId12"/>
+    <p:sldId id="282" r:id="rId13"/>
   </p:sldIdLst>
   <p:sldSz cx="12192000" cy="6858000"/>
   <p:notesSz cx="6858000" cy="9144000"/>
@@ -205,7 +211,7 @@
           <a:p>
             <a:fld id="{CAF05132-4288-4164-B1CA-F5AC1CC796A7}" type="datetime1">
               <a:rPr lang="pt-BR" smtClean="0"/>
-              <a:t>16/01/2026</a:t>
+              <a:t>11/02/2026</a:t>
             </a:fld>
             <a:endParaRPr lang="pt-BR" dirty="0"/>
           </a:p>
@@ -373,7 +379,7 @@
             <a:pPr rtl="0"/>
             <a:fld id="{437FA0DA-72A3-424F-8A35-066434C5B9F1}" type="datetime1">
               <a:rPr lang="pt-BR" noProof="0" smtClean="0"/>
-              <a:t>16/01/2026</a:t>
+              <a:t>11/02/2026</a:t>
             </a:fld>
             <a:endParaRPr lang="pt-BR" noProof="0" dirty="0"/>
           </a:p>
@@ -832,7 +838,7 @@
             <a:pPr rtl="0"/>
             <a:fld id="{F0354758-9FD6-46D3-BA08-042BE364EA46}" type="datetime1">
               <a:rPr lang="pt-BR" noProof="0" smtClean="0"/>
-              <a:t>16/01/2026</a:t>
+              <a:t>11/02/2026</a:t>
             </a:fld>
             <a:endParaRPr lang="pt-BR" noProof="0" dirty="0"/>
           </a:p>
@@ -1142,7 +1148,7 @@
             <a:pPr rtl="0"/>
             <a:fld id="{EC8ECD64-5AF2-4F32-AD18-136C465DC047}" type="datetime1">
               <a:rPr lang="pt-BR" noProof="0" smtClean="0"/>
-              <a:t>16/01/2026</a:t>
+              <a:t>11/02/2026</a:t>
             </a:fld>
             <a:endParaRPr lang="pt-BR" noProof="0" dirty="0"/>
           </a:p>
@@ -1340,7 +1346,7 @@
             <a:pPr rtl="0"/>
             <a:fld id="{83F6B3D0-4304-407F-B819-80FF4D568789}" type="datetime1">
               <a:rPr lang="pt-BR" noProof="0" smtClean="0"/>
-              <a:t>16/01/2026</a:t>
+              <a:t>11/02/2026</a:t>
             </a:fld>
             <a:endParaRPr lang="pt-BR" noProof="0" dirty="0"/>
           </a:p>
@@ -1607,7 +1613,7 @@
             <a:pPr rtl="0"/>
             <a:fld id="{16F363FB-ECEA-4A76-B765-85460030C156}" type="datetime1">
               <a:rPr lang="pt-BR" noProof="0" smtClean="0"/>
-              <a:t>16/01/2026</a:t>
+              <a:t>11/02/2026</a:t>
             </a:fld>
             <a:endParaRPr lang="pt-BR" noProof="0" dirty="0"/>
           </a:p>
@@ -2047,7 +2053,7 @@
             <a:pPr rtl="0"/>
             <a:fld id="{EF319CEA-9EF4-4A65-A004-44DCCF154232}" type="datetime1">
               <a:rPr lang="pt-BR" noProof="0" smtClean="0"/>
-              <a:t>16/01/2026</a:t>
+              <a:t>11/02/2026</a:t>
             </a:fld>
             <a:endParaRPr lang="pt-BR" noProof="0" dirty="0"/>
           </a:p>
@@ -2588,7 +2594,7 @@
             <a:pPr rtl="0"/>
             <a:fld id="{1591AA47-C612-4DA8-B151-4B748B7DAC4D}" type="datetime1">
               <a:rPr lang="pt-BR" noProof="0" smtClean="0"/>
-              <a:t>16/01/2026</a:t>
+              <a:t>11/02/2026</a:t>
             </a:fld>
             <a:endParaRPr lang="pt-BR" noProof="0" dirty="0"/>
           </a:p>
@@ -3477,7 +3483,7 @@
             <a:pPr rtl="0"/>
             <a:fld id="{DC27F2B2-02FF-4D65-8FE7-F6AE0D863843}" type="datetime1">
               <a:rPr lang="pt-BR" noProof="0" smtClean="0"/>
-              <a:t>16/01/2026</a:t>
+              <a:t>11/02/2026</a:t>
             </a:fld>
             <a:endParaRPr lang="pt-BR" noProof="0" dirty="0"/>
           </a:p>
@@ -3651,7 +3657,7 @@
             <a:pPr rtl="0"/>
             <a:fld id="{31A070AB-0B0E-4B2D-804F-566417906A61}" type="datetime1">
               <a:rPr lang="pt-BR" noProof="0" smtClean="0"/>
-              <a:t>16/01/2026</a:t>
+              <a:t>11/02/2026</a:t>
             </a:fld>
             <a:endParaRPr lang="pt-BR" noProof="0" dirty="0"/>
           </a:p>
@@ -3899,7 +3905,7 @@
             <a:pPr rtl="0"/>
             <a:fld id="{028BC9E8-30A4-4EE6-BB83-B04327D9020A}" type="datetime1">
               <a:rPr lang="pt-BR" noProof="0" smtClean="0"/>
-              <a:t>16/01/2026</a:t>
+              <a:t>11/02/2026</a:t>
             </a:fld>
             <a:endParaRPr lang="pt-BR" noProof="0" dirty="0"/>
           </a:p>
@@ -4145,7 +4151,7 @@
             <a:pPr rtl="0"/>
             <a:fld id="{6D2B272B-E9E3-4682-90D8-4B44853FAF6D}" type="datetime1">
               <a:rPr lang="pt-BR" noProof="0" smtClean="0"/>
-              <a:t>16/01/2026</a:t>
+              <a:t>11/02/2026</a:t>
             </a:fld>
             <a:endParaRPr lang="pt-BR" noProof="0" dirty="0"/>
           </a:p>
@@ -4632,7 +4638,7 @@
             <a:pPr rtl="0"/>
             <a:fld id="{0655272F-B51B-4957-97B0-074D18FB99AD}" type="datetime1">
               <a:rPr lang="pt-BR" noProof="0" smtClean="0"/>
-              <a:t>16/01/2026</a:t>
+              <a:t>11/02/2026</a:t>
             </a:fld>
             <a:endParaRPr lang="pt-BR" noProof="0" dirty="0"/>
           </a:p>
@@ -4754,7 +4760,7 @@
             <a:pPr rtl="0"/>
             <a:fld id="{C1056502-BDB4-46EE-9217-C5A23E5BE0CE}" type="datetime1">
               <a:rPr lang="pt-BR" noProof="0" smtClean="0"/>
-              <a:t>16/01/2026</a:t>
+              <a:t>11/02/2026</a:t>
             </a:fld>
             <a:endParaRPr lang="pt-BR" noProof="0" dirty="0"/>
           </a:p>
@@ -4852,7 +4858,7 @@
             <a:pPr rtl="0"/>
             <a:fld id="{05E6A84A-F340-402E-97D3-C59F51FBE66F}" type="datetime1">
               <a:rPr lang="pt-BR" noProof="0" smtClean="0"/>
-              <a:t>16/01/2026</a:t>
+              <a:t>11/02/2026</a:t>
             </a:fld>
             <a:endParaRPr lang="pt-BR" noProof="0" dirty="0"/>
           </a:p>
@@ -5111,7 +5117,7 @@
             <a:pPr rtl="0"/>
             <a:fld id="{50C5BF86-AA12-49E0-AC44-8E2B1E4B1B72}" type="datetime1">
               <a:rPr lang="pt-BR" noProof="0" smtClean="0"/>
-              <a:t>16/01/2026</a:t>
+              <a:t>11/02/2026</a:t>
             </a:fld>
             <a:endParaRPr lang="pt-BR" noProof="0" dirty="0"/>
           </a:p>
@@ -5423,7 +5429,7 @@
             <a:pPr rtl="0"/>
             <a:fld id="{685EFD07-A8B9-401F-868B-7649A9F826C1}" type="datetime1">
               <a:rPr lang="pt-BR" noProof="0" smtClean="0"/>
-              <a:t>16/01/2026</a:t>
+              <a:t>11/02/2026</a:t>
             </a:fld>
             <a:endParaRPr lang="pt-BR" noProof="0" dirty="0"/>
           </a:p>
@@ -5490,9 +5496,12 @@
 <p:sldMaster xmlns:a="http://schemas.openxmlformats.org/drawingml/2006/main" xmlns:r="http://schemas.openxmlformats.org/officeDocument/2006/relationships" xmlns:p="http://schemas.openxmlformats.org/presentationml/2006/main">
   <p:cSld>
     <p:bg>
-      <p:bgRef idx="1003">
-        <a:schemeClr val="bg1"/>
-      </p:bgRef>
+      <p:bgPr>
+        <a:solidFill>
+          <a:srgbClr val="FAF8F6"/>
+        </a:solidFill>
+        <a:effectLst/>
+      </p:bgPr>
     </p:bg>
     <p:spTree>
       <p:nvGrpSpPr>
@@ -5659,7 +5668,7 @@
             <a:pPr rtl="0"/>
             <a:fld id="{76D0790B-18CF-4284-B479-4F95A66DEDDE}" type="datetime1">
               <a:rPr lang="pt-BR" noProof="0" smtClean="0"/>
-              <a:t>16/01/2026</a:t>
+              <a:t>11/02/2026</a:t>
             </a:fld>
             <a:endParaRPr lang="pt-BR" noProof="0" dirty="0"/>
           </a:p>
@@ -5759,6 +5768,36 @@
           </a:p>
         </p:txBody>
       </p:sp>
+      <p:pic>
+        <p:nvPicPr>
+          <p:cNvPr id="8" name="Picture 7" descr="A logo with a black background&#10;&#10;AI-generated content may be incorrect.">
+            <a:extLst>
+              <a:ext uri="{FF2B5EF4-FFF2-40B4-BE49-F238E27FC236}">
+                <a16:creationId xmlns:a16="http://schemas.microsoft.com/office/drawing/2014/main" id="{1BE3ADA9-613F-6D1F-EB1F-831B50057F5C}"/>
+              </a:ext>
+            </a:extLst>
+          </p:cNvPr>
+          <p:cNvPicPr>
+            <a:picLocks noChangeAspect="1"/>
+          </p:cNvPicPr>
+          <p:nvPr userDrawn="1"/>
+        </p:nvPicPr>
+        <p:blipFill>
+          <a:blip r:embed="rId17"/>
+          <a:stretch>
+            <a:fillRect/>
+          </a:stretch>
+        </p:blipFill>
+        <p:spPr>
+          <a:xfrm>
+            <a:off x="5550061" y="6454774"/>
+            <a:ext cx="1081229" cy="365126"/>
+          </a:xfrm>
+          <a:prstGeom prst="rect">
+            <a:avLst/>
+          </a:prstGeom>
+        </p:spPr>
+      </p:pic>
     </p:spTree>
     <p:extLst>
       <p:ext uri="{BB962C8B-B14F-4D97-AF65-F5344CB8AC3E}">
@@ -5806,7 +5845,7 @@
             </a:solidFill>
           </a:ln>
           <a:solidFill>
-            <a:schemeClr val="tx2"/>
+            <a:schemeClr val="bg1"/>
           </a:solidFill>
           <a:effectLst>
             <a:outerShdw blurRad="9525" dist="25400" dir="14640000" algn="tl" rotWithShape="0">
@@ -5905,15 +5944,9 @@
             </a:solidFill>
           </a:ln>
           <a:solidFill>
-            <a:schemeClr val="tx2"/>
+            <a:schemeClr val="bg1"/>
           </a:solidFill>
-          <a:effectLst>
-            <a:outerShdw blurRad="9525" dist="25400" dir="14640000" algn="tl" rotWithShape="0">
-              <a:schemeClr val="bg1">
-                <a:alpha val="30000"/>
-              </a:schemeClr>
-            </a:outerShdw>
-          </a:effectLst>
+          <a:effectLst/>
           <a:latin typeface="+mn-lt"/>
           <a:ea typeface="+mn-ea"/>
           <a:cs typeface="+mn-cs"/>
@@ -5943,15 +5976,9 @@
             </a:solidFill>
           </a:ln>
           <a:solidFill>
-            <a:schemeClr val="tx2"/>
+            <a:schemeClr val="bg1"/>
           </a:solidFill>
-          <a:effectLst>
-            <a:outerShdw blurRad="9525" dist="25400" dir="14640000" algn="tl" rotWithShape="0">
-              <a:schemeClr val="bg1">
-                <a:alpha val="30000"/>
-              </a:schemeClr>
-            </a:outerShdw>
-          </a:effectLst>
+          <a:effectLst/>
           <a:latin typeface="+mn-lt"/>
           <a:ea typeface="+mn-ea"/>
           <a:cs typeface="+mn-cs"/>
@@ -5981,15 +6008,9 @@
             </a:solidFill>
           </a:ln>
           <a:solidFill>
-            <a:schemeClr val="tx2"/>
+            <a:schemeClr val="bg1"/>
           </a:solidFill>
-          <a:effectLst>
-            <a:outerShdw blurRad="9525" dist="25400" dir="14640000" algn="tl" rotWithShape="0">
-              <a:schemeClr val="bg1">
-                <a:alpha val="30000"/>
-              </a:schemeClr>
-            </a:outerShdw>
-          </a:effectLst>
+          <a:effectLst/>
           <a:latin typeface="+mn-lt"/>
           <a:ea typeface="+mn-ea"/>
           <a:cs typeface="+mn-cs"/>
@@ -6019,15 +6040,9 @@
             </a:solidFill>
           </a:ln>
           <a:solidFill>
-            <a:schemeClr val="tx2"/>
+            <a:schemeClr val="bg1"/>
           </a:solidFill>
-          <a:effectLst>
-            <a:outerShdw blurRad="9525" dist="25400" dir="14640000" algn="tl" rotWithShape="0">
-              <a:schemeClr val="bg1">
-                <a:alpha val="30000"/>
-              </a:schemeClr>
-            </a:outerShdw>
-          </a:effectLst>
+          <a:effectLst/>
           <a:latin typeface="+mn-lt"/>
           <a:ea typeface="+mn-ea"/>
           <a:cs typeface="+mn-cs"/>
@@ -6057,15 +6072,9 @@
             </a:solidFill>
           </a:ln>
           <a:solidFill>
-            <a:schemeClr val="tx2"/>
+            <a:schemeClr val="bg1"/>
           </a:solidFill>
-          <a:effectLst>
-            <a:outerShdw blurRad="9525" dist="25400" dir="14640000" algn="tl" rotWithShape="0">
-              <a:schemeClr val="bg1">
-                <a:alpha val="30000"/>
-              </a:schemeClr>
-            </a:outerShdw>
-          </a:effectLst>
+          <a:effectLst/>
           <a:latin typeface="+mn-lt"/>
           <a:ea typeface="+mn-ea"/>
           <a:cs typeface="+mn-cs"/>
@@ -6372,6 +6381,66 @@
           <a:noFill/>
         </p:spPr>
       </p:pic>
+      <p:sp>
+        <p:nvSpPr>
+          <p:cNvPr id="2" name="Rectangle 1">
+            <a:extLst>
+              <a:ext uri="{FF2B5EF4-FFF2-40B4-BE49-F238E27FC236}">
+                <a16:creationId xmlns:a16="http://schemas.microsoft.com/office/drawing/2014/main" id="{066C70C1-17B6-EF7C-2653-F4426A379E47}"/>
+              </a:ext>
+            </a:extLst>
+          </p:cNvPr>
+          <p:cNvSpPr/>
+          <p:nvPr/>
+        </p:nvSpPr>
+        <p:spPr>
+          <a:xfrm>
+            <a:off x="57150" y="5962650"/>
+            <a:ext cx="6229350" cy="793750"/>
+          </a:xfrm>
+          <a:prstGeom prst="rect">
+            <a:avLst/>
+          </a:prstGeom>
+          <a:solidFill>
+            <a:srgbClr val="232937"/>
+          </a:solidFill>
+          <a:ln>
+            <a:noFill/>
+          </a:ln>
+        </p:spPr>
+        <p:style>
+          <a:lnRef idx="2">
+            <a:schemeClr val="accent1">
+              <a:shade val="15000"/>
+            </a:schemeClr>
+          </a:lnRef>
+          <a:fillRef idx="1">
+            <a:schemeClr val="accent1"/>
+          </a:fillRef>
+          <a:effectRef idx="0">
+            <a:schemeClr val="accent1"/>
+          </a:effectRef>
+          <a:fontRef idx="minor">
+            <a:schemeClr val="lt1"/>
+          </a:fontRef>
+        </p:style>
+        <p:txBody>
+          <a:bodyPr rtlCol="0" anchor="ctr"/>
+          <a:lstStyle/>
+          <a:p>
+            <a:r>
+              <a:rPr lang="pt-BR" sz="2800" b="1" dirty="0"/>
+              <a:t>ASSOGW</a:t>
+            </a:r>
+          </a:p>
+          <a:p>
+            <a:r>
+              <a:rPr lang="pt-BR" sz="1200" dirty="0"/>
+              <a:t>ASSOCIAÇÃO DE CONCESSIONÁRIAS GREAT WALL</a:t>
+            </a:r>
+          </a:p>
+        </p:txBody>
+      </p:sp>
     </p:spTree>
     <p:extLst>
       <p:ext uri="{BB962C8B-B14F-4D97-AF65-F5344CB8AC3E}">
@@ -6386,6 +6455,2279 @@
 </file>
 
 <file path=ppt/slides/slide2.xml><?xml version="1.0" encoding="utf-8"?>
+<p:sld xmlns:a="http://schemas.openxmlformats.org/drawingml/2006/main" xmlns:r="http://schemas.openxmlformats.org/officeDocument/2006/relationships" xmlns:p="http://schemas.openxmlformats.org/presentationml/2006/main">
+  <p:cSld>
+    <p:bg>
+      <p:bgPr>
+        <a:solidFill>
+          <a:srgbClr val="FAF8F6"/>
+        </a:solidFill>
+        <a:effectLst/>
+      </p:bgPr>
+    </p:bg>
+    <p:spTree>
+      <p:nvGrpSpPr>
+        <p:cNvPr id="1" name="">
+          <a:extLst>
+            <a:ext uri="{FF2B5EF4-FFF2-40B4-BE49-F238E27FC236}">
+              <a16:creationId xmlns:a16="http://schemas.microsoft.com/office/drawing/2014/main" id="{CCA05EBB-763F-0C44-62A5-D7C291F3C476}"/>
+            </a:ext>
+          </a:extLst>
+        </p:cNvPr>
+        <p:cNvGrpSpPr/>
+        <p:nvPr/>
+      </p:nvGrpSpPr>
+      <p:grpSpPr>
+        <a:xfrm>
+          <a:off x="0" y="0"/>
+          <a:ext cx="0" cy="0"/>
+          <a:chOff x="0" y="0"/>
+          <a:chExt cx="0" cy="0"/>
+        </a:xfrm>
+      </p:grpSpPr>
+      <p:sp>
+        <p:nvSpPr>
+          <p:cNvPr id="2" name="Title 1">
+            <a:extLst>
+              <a:ext uri="{FF2B5EF4-FFF2-40B4-BE49-F238E27FC236}">
+                <a16:creationId xmlns:a16="http://schemas.microsoft.com/office/drawing/2014/main" id="{6BE33DD4-45A8-2575-8211-771A9CB1B13F}"/>
+              </a:ext>
+            </a:extLst>
+          </p:cNvPr>
+          <p:cNvSpPr>
+            <a:spLocks noGrp="1"/>
+          </p:cNvSpPr>
+          <p:nvPr>
+            <p:ph type="title"/>
+          </p:nvPr>
+        </p:nvSpPr>
+        <p:spPr>
+          <a:xfrm>
+            <a:off x="913795" y="51435"/>
+            <a:ext cx="10353762" cy="1383030"/>
+          </a:xfrm>
+        </p:spPr>
+        <p:txBody>
+          <a:bodyPr/>
+          <a:lstStyle/>
+          <a:p>
+            <a:r>
+              <a:rPr lang="pt-BR" dirty="0">
+                <a:solidFill>
+                  <a:schemeClr val="bg1"/>
+                </a:solidFill>
+              </a:rPr>
+              <a:t>A Linguagem das Cores</a:t>
+            </a:r>
+          </a:p>
+        </p:txBody>
+      </p:sp>
+      <p:sp>
+        <p:nvSpPr>
+          <p:cNvPr id="3" name="Content Placeholder 2">
+            <a:extLst>
+              <a:ext uri="{FF2B5EF4-FFF2-40B4-BE49-F238E27FC236}">
+                <a16:creationId xmlns:a16="http://schemas.microsoft.com/office/drawing/2014/main" id="{A3C7CB49-225F-050D-1B49-3FCED37A8D1B}"/>
+              </a:ext>
+            </a:extLst>
+          </p:cNvPr>
+          <p:cNvSpPr>
+            <a:spLocks noGrp="1"/>
+          </p:cNvSpPr>
+          <p:nvPr>
+            <p:ph idx="1"/>
+          </p:nvPr>
+        </p:nvSpPr>
+        <p:spPr>
+          <a:xfrm>
+            <a:off x="913795" y="1482726"/>
+            <a:ext cx="10353762" cy="3965574"/>
+          </a:xfrm>
+        </p:spPr>
+        <p:txBody>
+          <a:bodyPr>
+            <a:normAutofit/>
+          </a:bodyPr>
+          <a:lstStyle/>
+          <a:p>
+            <a:pPr marL="36900" indent="0">
+              <a:buNone/>
+            </a:pPr>
+            <a:r>
+              <a:rPr lang="pt-BR" dirty="0">
+                <a:solidFill>
+                  <a:schemeClr val="bg1"/>
+                </a:solidFill>
+                <a:effectLst/>
+              </a:rPr>
+              <a:t>A identidade visual da </a:t>
+            </a:r>
+            <a:r>
+              <a:rPr lang="pt-BR" u="sng" dirty="0">
+                <a:solidFill>
+                  <a:schemeClr val="bg1"/>
+                </a:solidFill>
+                <a:effectLst/>
+              </a:rPr>
+              <a:t>ASSOGW</a:t>
+            </a:r>
+            <a:r>
+              <a:rPr lang="pt-BR" dirty="0">
+                <a:solidFill>
+                  <a:schemeClr val="bg1"/>
+                </a:solidFill>
+                <a:effectLst/>
+              </a:rPr>
+              <a:t> nasce de uma escolha deliberada: traduzir em cores os valores de uma associação que representa o futuro da mobilidade no Brasil. Cada tom foi selecionado para comunicar com </a:t>
+            </a:r>
+            <a:r>
+              <a:rPr lang="pt-BR" u="sng" dirty="0">
+                <a:solidFill>
+                  <a:schemeClr val="bg1"/>
+                </a:solidFill>
+                <a:effectLst/>
+              </a:rPr>
+              <a:t>distinção</a:t>
+            </a:r>
+            <a:r>
+              <a:rPr lang="pt-BR" dirty="0">
+                <a:solidFill>
+                  <a:schemeClr val="bg1"/>
+                </a:solidFill>
+                <a:effectLst/>
+              </a:rPr>
+              <a:t>, juntos criam uma paleta que é, ao mesmo tempo, institucional e </a:t>
+            </a:r>
+            <a:r>
+              <a:rPr lang="pt-BR" u="sng" dirty="0">
+                <a:solidFill>
+                  <a:schemeClr val="bg1"/>
+                </a:solidFill>
+                <a:effectLst/>
+              </a:rPr>
+              <a:t>contemporânea</a:t>
+            </a:r>
+            <a:r>
+              <a:rPr lang="pt-BR" dirty="0">
+                <a:solidFill>
+                  <a:schemeClr val="bg1"/>
+                </a:solidFill>
+                <a:effectLst/>
+              </a:rPr>
+              <a:t>.</a:t>
+            </a:r>
+          </a:p>
+        </p:txBody>
+      </p:sp>
+      <p:pic>
+        <p:nvPicPr>
+          <p:cNvPr id="5" name="Picture 4" descr="A car parked in front of a pool&#10;&#10;AI-generated content may be incorrect.">
+            <a:extLst>
+              <a:ext uri="{FF2B5EF4-FFF2-40B4-BE49-F238E27FC236}">
+                <a16:creationId xmlns:a16="http://schemas.microsoft.com/office/drawing/2014/main" id="{4EB01683-4244-EC0B-AC93-337E61555BCD}"/>
+              </a:ext>
+            </a:extLst>
+          </p:cNvPr>
+          <p:cNvPicPr>
+            <a:picLocks noChangeAspect="1"/>
+          </p:cNvPicPr>
+          <p:nvPr/>
+        </p:nvPicPr>
+        <p:blipFill>
+          <a:blip r:embed="rId2"/>
+          <a:srcRect l="-328" t="31880" r="1376" b="15482"/>
+          <a:stretch>
+            <a:fillRect/>
+          </a:stretch>
+        </p:blipFill>
+        <p:spPr>
+          <a:xfrm>
+            <a:off x="1509395" y="3465513"/>
+            <a:ext cx="9162562" cy="2705100"/>
+          </a:xfrm>
+          <a:prstGeom prst="rect">
+            <a:avLst/>
+          </a:prstGeom>
+          <a:noFill/>
+        </p:spPr>
+      </p:pic>
+    </p:spTree>
+    <p:extLst>
+      <p:ext uri="{BB962C8B-B14F-4D97-AF65-F5344CB8AC3E}">
+        <p14:creationId xmlns:p14="http://schemas.microsoft.com/office/powerpoint/2010/main" val="3467612670"/>
+      </p:ext>
+    </p:extLst>
+  </p:cSld>
+  <p:clrMapOvr>
+    <a:masterClrMapping/>
+  </p:clrMapOvr>
+</p:sld>
+</file>
+
+<file path=ppt/slides/slide3.xml><?xml version="1.0" encoding="utf-8"?>
+<p:sld xmlns:a="http://schemas.openxmlformats.org/drawingml/2006/main" xmlns:r="http://schemas.openxmlformats.org/officeDocument/2006/relationships" xmlns:p="http://schemas.openxmlformats.org/presentationml/2006/main">
+  <p:cSld>
+    <p:bg>
+      <p:bgPr>
+        <a:solidFill>
+          <a:srgbClr val="FAF8F6"/>
+        </a:solidFill>
+        <a:effectLst/>
+      </p:bgPr>
+    </p:bg>
+    <p:spTree>
+      <p:nvGrpSpPr>
+        <p:cNvPr id="1" name=""/>
+        <p:cNvGrpSpPr/>
+        <p:nvPr/>
+      </p:nvGrpSpPr>
+      <p:grpSpPr>
+        <a:xfrm>
+          <a:off x="0" y="0"/>
+          <a:ext cx="0" cy="0"/>
+          <a:chOff x="0" y="0"/>
+          <a:chExt cx="0" cy="0"/>
+        </a:xfrm>
+      </p:grpSpPr>
+      <p:sp>
+        <p:nvSpPr>
+          <p:cNvPr id="2" name="Title 1">
+            <a:extLst>
+              <a:ext uri="{FF2B5EF4-FFF2-40B4-BE49-F238E27FC236}">
+                <a16:creationId xmlns:a16="http://schemas.microsoft.com/office/drawing/2014/main" id="{37AB8805-9C92-5C65-8094-8CA84F52C5C4}"/>
+              </a:ext>
+            </a:extLst>
+          </p:cNvPr>
+          <p:cNvSpPr>
+            <a:spLocks noGrp="1"/>
+          </p:cNvSpPr>
+          <p:nvPr>
+            <p:ph type="title"/>
+          </p:nvPr>
+        </p:nvSpPr>
+        <p:spPr>
+          <a:xfrm>
+            <a:off x="913795" y="51435"/>
+            <a:ext cx="10353762" cy="1383030"/>
+          </a:xfrm>
+        </p:spPr>
+        <p:txBody>
+          <a:bodyPr/>
+          <a:lstStyle/>
+          <a:p>
+            <a:r>
+              <a:rPr lang="pt-BR" dirty="0">
+                <a:solidFill>
+                  <a:schemeClr val="bg1"/>
+                </a:solidFill>
+              </a:rPr>
+              <a:t>Azul Naval, a base</a:t>
+            </a:r>
+          </a:p>
+        </p:txBody>
+      </p:sp>
+      <p:sp>
+        <p:nvSpPr>
+          <p:cNvPr id="3" name="Content Placeholder 2">
+            <a:extLst>
+              <a:ext uri="{FF2B5EF4-FFF2-40B4-BE49-F238E27FC236}">
+                <a16:creationId xmlns:a16="http://schemas.microsoft.com/office/drawing/2014/main" id="{88BA4B6A-0AAB-3D57-597C-E760B5FD53F8}"/>
+              </a:ext>
+            </a:extLst>
+          </p:cNvPr>
+          <p:cNvSpPr>
+            <a:spLocks noGrp="1"/>
+          </p:cNvSpPr>
+          <p:nvPr>
+            <p:ph idx="1"/>
+          </p:nvPr>
+        </p:nvSpPr>
+        <p:spPr>
+          <a:xfrm>
+            <a:off x="913795" y="1482726"/>
+            <a:ext cx="10353762" cy="2165348"/>
+          </a:xfrm>
+        </p:spPr>
+        <p:txBody>
+          <a:bodyPr>
+            <a:normAutofit/>
+          </a:bodyPr>
+          <a:lstStyle/>
+          <a:p>
+            <a:pPr marL="36900" indent="0">
+              <a:buNone/>
+            </a:pPr>
+            <a:r>
+              <a:rPr lang="pt-BR" dirty="0">
+                <a:solidFill>
+                  <a:schemeClr val="bg1"/>
+                </a:solidFill>
+                <a:effectLst/>
+              </a:rPr>
+              <a:t>O azul profundo é a cor institucional da ASSOGW. Ele carrega </a:t>
+            </a:r>
+            <a:r>
+              <a:rPr lang="pt-BR" u="sng" dirty="0">
+                <a:solidFill>
+                  <a:schemeClr val="bg1"/>
+                </a:solidFill>
+                <a:effectLst/>
+              </a:rPr>
+              <a:t>solidez</a:t>
+            </a:r>
+            <a:r>
+              <a:rPr lang="pt-BR" dirty="0">
+                <a:solidFill>
+                  <a:schemeClr val="bg1"/>
+                </a:solidFill>
+                <a:effectLst/>
+              </a:rPr>
+              <a:t>, </a:t>
+            </a:r>
+            <a:r>
+              <a:rPr lang="pt-BR" u="sng" dirty="0">
+                <a:solidFill>
+                  <a:schemeClr val="bg1"/>
+                </a:solidFill>
+                <a:effectLst/>
+              </a:rPr>
+              <a:t>confiança</a:t>
+            </a:r>
+            <a:r>
+              <a:rPr lang="pt-BR" dirty="0">
+                <a:solidFill>
+                  <a:schemeClr val="bg1"/>
+                </a:solidFill>
+                <a:effectLst/>
+              </a:rPr>
+              <a:t> e </a:t>
+            </a:r>
+            <a:r>
+              <a:rPr lang="pt-BR" u="sng" dirty="0">
+                <a:solidFill>
+                  <a:schemeClr val="bg1"/>
+                </a:solidFill>
+                <a:effectLst/>
+              </a:rPr>
+              <a:t>seriedade</a:t>
+            </a:r>
+            <a:r>
+              <a:rPr lang="pt-BR" dirty="0">
+                <a:solidFill>
+                  <a:schemeClr val="bg1"/>
+                </a:solidFill>
+                <a:effectLst/>
+              </a:rPr>
+              <a:t>. É a cor dos títulos, dos elementos de destaque e da presença principal da marca em qualquer material. Quando alguém vê esse azul, deve pensar em ASSOGW.</a:t>
+            </a:r>
+          </a:p>
+          <a:p>
+            <a:pPr marL="36900" indent="0">
+              <a:buNone/>
+            </a:pPr>
+            <a:r>
+              <a:rPr lang="pt-BR" dirty="0">
+                <a:solidFill>
+                  <a:schemeClr val="bg1"/>
+                </a:solidFill>
+                <a:effectLst/>
+              </a:rPr>
+              <a:t>Uma variação mais escura, quase noturna, é usada em fundos e seções de contraste, trazendo profundidade e sofisticação sem perder a conexão com o azul principal.</a:t>
+            </a:r>
+          </a:p>
+        </p:txBody>
+      </p:sp>
+      <p:sp>
+        <p:nvSpPr>
+          <p:cNvPr id="4" name="Rectangle 3">
+            <a:extLst>
+              <a:ext uri="{FF2B5EF4-FFF2-40B4-BE49-F238E27FC236}">
+                <a16:creationId xmlns:a16="http://schemas.microsoft.com/office/drawing/2014/main" id="{F5B581B6-DE16-35C7-7D55-65ADA0FF16EC}"/>
+              </a:ext>
+            </a:extLst>
+          </p:cNvPr>
+          <p:cNvSpPr/>
+          <p:nvPr/>
+        </p:nvSpPr>
+        <p:spPr>
+          <a:xfrm>
+            <a:off x="4114800" y="3975100"/>
+            <a:ext cx="1803400" cy="2260600"/>
+          </a:xfrm>
+          <a:prstGeom prst="rect">
+            <a:avLst/>
+          </a:prstGeom>
+          <a:solidFill>
+            <a:srgbClr val="214B71"/>
+          </a:solidFill>
+          <a:ln>
+            <a:noFill/>
+          </a:ln>
+        </p:spPr>
+        <p:style>
+          <a:lnRef idx="2">
+            <a:schemeClr val="accent1">
+              <a:shade val="15000"/>
+            </a:schemeClr>
+          </a:lnRef>
+          <a:fillRef idx="1">
+            <a:schemeClr val="accent1"/>
+          </a:fillRef>
+          <a:effectRef idx="0">
+            <a:schemeClr val="accent1"/>
+          </a:effectRef>
+          <a:fontRef idx="minor">
+            <a:schemeClr val="lt1"/>
+          </a:fontRef>
+        </p:style>
+        <p:txBody>
+          <a:bodyPr rtlCol="0" anchor="ctr"/>
+          <a:lstStyle/>
+          <a:p>
+            <a:pPr algn="ctr"/>
+            <a:endParaRPr lang="pt-BR"/>
+          </a:p>
+        </p:txBody>
+      </p:sp>
+      <p:sp>
+        <p:nvSpPr>
+          <p:cNvPr id="6" name="Rectangle 5">
+            <a:extLst>
+              <a:ext uri="{FF2B5EF4-FFF2-40B4-BE49-F238E27FC236}">
+                <a16:creationId xmlns:a16="http://schemas.microsoft.com/office/drawing/2014/main" id="{04215B6B-D881-8A02-C897-9B3D22CE6436}"/>
+              </a:ext>
+            </a:extLst>
+          </p:cNvPr>
+          <p:cNvSpPr/>
+          <p:nvPr/>
+        </p:nvSpPr>
+        <p:spPr>
+          <a:xfrm>
+            <a:off x="6096000" y="3975100"/>
+            <a:ext cx="1803400" cy="2260600"/>
+          </a:xfrm>
+          <a:prstGeom prst="rect">
+            <a:avLst/>
+          </a:prstGeom>
+          <a:solidFill>
+            <a:srgbClr val="242B38"/>
+          </a:solidFill>
+          <a:ln>
+            <a:noFill/>
+          </a:ln>
+        </p:spPr>
+        <p:style>
+          <a:lnRef idx="2">
+            <a:schemeClr val="accent1">
+              <a:shade val="15000"/>
+            </a:schemeClr>
+          </a:lnRef>
+          <a:fillRef idx="1">
+            <a:schemeClr val="accent1"/>
+          </a:fillRef>
+          <a:effectRef idx="0">
+            <a:schemeClr val="accent1"/>
+          </a:effectRef>
+          <a:fontRef idx="minor">
+            <a:schemeClr val="lt1"/>
+          </a:fontRef>
+        </p:style>
+        <p:txBody>
+          <a:bodyPr rtlCol="0" anchor="ctr"/>
+          <a:lstStyle/>
+          <a:p>
+            <a:pPr algn="ctr"/>
+            <a:endParaRPr lang="pt-BR"/>
+          </a:p>
+        </p:txBody>
+      </p:sp>
+    </p:spTree>
+    <p:extLst>
+      <p:ext uri="{BB962C8B-B14F-4D97-AF65-F5344CB8AC3E}">
+        <p14:creationId xmlns:p14="http://schemas.microsoft.com/office/powerpoint/2010/main" val="390648143"/>
+      </p:ext>
+    </p:extLst>
+  </p:cSld>
+  <p:clrMapOvr>
+    <a:masterClrMapping/>
+  </p:clrMapOvr>
+</p:sld>
+</file>
+
+<file path=ppt/slides/slide4.xml><?xml version="1.0" encoding="utf-8"?>
+<p:sld xmlns:a="http://schemas.openxmlformats.org/drawingml/2006/main" xmlns:r="http://schemas.openxmlformats.org/officeDocument/2006/relationships" xmlns:p="http://schemas.openxmlformats.org/presentationml/2006/main">
+  <p:cSld>
+    <p:bg>
+      <p:bgPr>
+        <a:solidFill>
+          <a:srgbClr val="FAF8F6"/>
+        </a:solidFill>
+        <a:effectLst/>
+      </p:bgPr>
+    </p:bg>
+    <p:spTree>
+      <p:nvGrpSpPr>
+        <p:cNvPr id="1" name="">
+          <a:extLst>
+            <a:ext uri="{FF2B5EF4-FFF2-40B4-BE49-F238E27FC236}">
+              <a16:creationId xmlns:a16="http://schemas.microsoft.com/office/drawing/2014/main" id="{63111F57-086F-0484-A6B7-EB820439363F}"/>
+            </a:ext>
+          </a:extLst>
+        </p:cNvPr>
+        <p:cNvGrpSpPr/>
+        <p:nvPr/>
+      </p:nvGrpSpPr>
+      <p:grpSpPr>
+        <a:xfrm>
+          <a:off x="0" y="0"/>
+          <a:ext cx="0" cy="0"/>
+          <a:chOff x="0" y="0"/>
+          <a:chExt cx="0" cy="0"/>
+        </a:xfrm>
+      </p:grpSpPr>
+      <p:sp>
+        <p:nvSpPr>
+          <p:cNvPr id="2" name="Title 1">
+            <a:extLst>
+              <a:ext uri="{FF2B5EF4-FFF2-40B4-BE49-F238E27FC236}">
+                <a16:creationId xmlns:a16="http://schemas.microsoft.com/office/drawing/2014/main" id="{7AD5CAC9-9BB8-7F27-EE39-A0A7DE7BCB67}"/>
+              </a:ext>
+            </a:extLst>
+          </p:cNvPr>
+          <p:cNvSpPr>
+            <a:spLocks noGrp="1"/>
+          </p:cNvSpPr>
+          <p:nvPr>
+            <p:ph type="title"/>
+          </p:nvPr>
+        </p:nvSpPr>
+        <p:spPr>
+          <a:xfrm>
+            <a:off x="913795" y="51435"/>
+            <a:ext cx="10353762" cy="1383030"/>
+          </a:xfrm>
+        </p:spPr>
+        <p:txBody>
+          <a:bodyPr/>
+          <a:lstStyle/>
+          <a:p>
+            <a:r>
+              <a:rPr lang="pt-BR" dirty="0">
+                <a:solidFill>
+                  <a:schemeClr val="bg1"/>
+                </a:solidFill>
+              </a:rPr>
+              <a:t>Dourado, a distinção</a:t>
+            </a:r>
+          </a:p>
+        </p:txBody>
+      </p:sp>
+      <p:sp>
+        <p:nvSpPr>
+          <p:cNvPr id="3" name="Content Placeholder 2">
+            <a:extLst>
+              <a:ext uri="{FF2B5EF4-FFF2-40B4-BE49-F238E27FC236}">
+                <a16:creationId xmlns:a16="http://schemas.microsoft.com/office/drawing/2014/main" id="{775DFE38-99E0-395E-D987-1556C1B0E993}"/>
+              </a:ext>
+            </a:extLst>
+          </p:cNvPr>
+          <p:cNvSpPr>
+            <a:spLocks noGrp="1"/>
+          </p:cNvSpPr>
+          <p:nvPr>
+            <p:ph idx="1"/>
+          </p:nvPr>
+        </p:nvSpPr>
+        <p:spPr>
+          <a:xfrm>
+            <a:off x="913795" y="1482726"/>
+            <a:ext cx="10353762" cy="2165348"/>
+          </a:xfrm>
+        </p:spPr>
+        <p:txBody>
+          <a:bodyPr>
+            <a:normAutofit/>
+          </a:bodyPr>
+          <a:lstStyle/>
+          <a:p>
+            <a:pPr marL="36900" indent="0">
+              <a:buNone/>
+            </a:pPr>
+            <a:r>
+              <a:rPr lang="pt-BR" dirty="0">
+                <a:solidFill>
+                  <a:schemeClr val="bg1"/>
+                </a:solidFill>
+                <a:effectLst/>
+              </a:rPr>
+              <a:t>O dourado é o </a:t>
+            </a:r>
+            <a:r>
+              <a:rPr lang="pt-BR" u="sng" dirty="0">
+                <a:solidFill>
+                  <a:schemeClr val="bg1"/>
+                </a:solidFill>
+                <a:effectLst/>
+              </a:rPr>
+              <a:t>contraponto sofisticado e elegante</a:t>
+            </a:r>
+            <a:r>
+              <a:rPr lang="pt-BR" dirty="0">
+                <a:solidFill>
+                  <a:schemeClr val="bg1"/>
+                </a:solidFill>
+                <a:effectLst/>
+              </a:rPr>
+              <a:t> ao azul. Ele aparece nos detalhes que fazem a diferença: separadores, acentos, ícones e elementos decorativos. Não é um dourado ostensivo, é sutil, quente, que transmite qualidade sem gritar. Uma variação mais densa, que chamamos de bronze, funciona para textos secundários e metadados sobre fundos claros.</a:t>
+            </a:r>
+          </a:p>
+        </p:txBody>
+      </p:sp>
+      <p:sp>
+        <p:nvSpPr>
+          <p:cNvPr id="4" name="Rectangle 3">
+            <a:extLst>
+              <a:ext uri="{FF2B5EF4-FFF2-40B4-BE49-F238E27FC236}">
+                <a16:creationId xmlns:a16="http://schemas.microsoft.com/office/drawing/2014/main" id="{B76EB439-CE88-00AC-CF44-690810B068D6}"/>
+              </a:ext>
+            </a:extLst>
+          </p:cNvPr>
+          <p:cNvSpPr/>
+          <p:nvPr/>
+        </p:nvSpPr>
+        <p:spPr>
+          <a:xfrm>
+            <a:off x="2133600" y="3962400"/>
+            <a:ext cx="1803400" cy="2260600"/>
+          </a:xfrm>
+          <a:prstGeom prst="rect">
+            <a:avLst/>
+          </a:prstGeom>
+          <a:solidFill>
+            <a:srgbClr val="214B71"/>
+          </a:solidFill>
+          <a:ln>
+            <a:noFill/>
+          </a:ln>
+        </p:spPr>
+        <p:style>
+          <a:lnRef idx="2">
+            <a:schemeClr val="accent1">
+              <a:shade val="15000"/>
+            </a:schemeClr>
+          </a:lnRef>
+          <a:fillRef idx="1">
+            <a:schemeClr val="accent1"/>
+          </a:fillRef>
+          <a:effectRef idx="0">
+            <a:schemeClr val="accent1"/>
+          </a:effectRef>
+          <a:fontRef idx="minor">
+            <a:schemeClr val="lt1"/>
+          </a:fontRef>
+        </p:style>
+        <p:txBody>
+          <a:bodyPr rtlCol="0" anchor="ctr"/>
+          <a:lstStyle/>
+          <a:p>
+            <a:pPr algn="ctr"/>
+            <a:endParaRPr lang="pt-BR"/>
+          </a:p>
+        </p:txBody>
+      </p:sp>
+      <p:sp>
+        <p:nvSpPr>
+          <p:cNvPr id="6" name="Rectangle 5">
+            <a:extLst>
+              <a:ext uri="{FF2B5EF4-FFF2-40B4-BE49-F238E27FC236}">
+                <a16:creationId xmlns:a16="http://schemas.microsoft.com/office/drawing/2014/main" id="{BFA091F2-9F6F-B3D0-F6D9-735AD30E8FB3}"/>
+              </a:ext>
+            </a:extLst>
+          </p:cNvPr>
+          <p:cNvSpPr/>
+          <p:nvPr/>
+        </p:nvSpPr>
+        <p:spPr>
+          <a:xfrm>
+            <a:off x="4114800" y="3962400"/>
+            <a:ext cx="1803400" cy="2260600"/>
+          </a:xfrm>
+          <a:prstGeom prst="rect">
+            <a:avLst/>
+          </a:prstGeom>
+          <a:solidFill>
+            <a:srgbClr val="242B38"/>
+          </a:solidFill>
+          <a:ln>
+            <a:noFill/>
+          </a:ln>
+        </p:spPr>
+        <p:style>
+          <a:lnRef idx="2">
+            <a:schemeClr val="accent1">
+              <a:shade val="15000"/>
+            </a:schemeClr>
+          </a:lnRef>
+          <a:fillRef idx="1">
+            <a:schemeClr val="accent1"/>
+          </a:fillRef>
+          <a:effectRef idx="0">
+            <a:schemeClr val="accent1"/>
+          </a:effectRef>
+          <a:fontRef idx="minor">
+            <a:schemeClr val="lt1"/>
+          </a:fontRef>
+        </p:style>
+        <p:txBody>
+          <a:bodyPr rtlCol="0" anchor="ctr"/>
+          <a:lstStyle/>
+          <a:p>
+            <a:pPr algn="ctr"/>
+            <a:endParaRPr lang="pt-BR"/>
+          </a:p>
+        </p:txBody>
+      </p:sp>
+      <p:sp>
+        <p:nvSpPr>
+          <p:cNvPr id="8" name="Rectangle 7">
+            <a:extLst>
+              <a:ext uri="{FF2B5EF4-FFF2-40B4-BE49-F238E27FC236}">
+                <a16:creationId xmlns:a16="http://schemas.microsoft.com/office/drawing/2014/main" id="{0AB490B7-CC3A-101B-75C8-DD836ECCF5FE}"/>
+              </a:ext>
+            </a:extLst>
+          </p:cNvPr>
+          <p:cNvSpPr/>
+          <p:nvPr/>
+        </p:nvSpPr>
+        <p:spPr>
+          <a:xfrm>
+            <a:off x="6096000" y="3962400"/>
+            <a:ext cx="1803400" cy="2260600"/>
+          </a:xfrm>
+          <a:prstGeom prst="rect">
+            <a:avLst/>
+          </a:prstGeom>
+          <a:solidFill>
+            <a:srgbClr val="D4BF90"/>
+          </a:solidFill>
+          <a:ln>
+            <a:noFill/>
+          </a:ln>
+        </p:spPr>
+        <p:style>
+          <a:lnRef idx="2">
+            <a:schemeClr val="accent1">
+              <a:shade val="15000"/>
+            </a:schemeClr>
+          </a:lnRef>
+          <a:fillRef idx="1">
+            <a:schemeClr val="accent1"/>
+          </a:fillRef>
+          <a:effectRef idx="0">
+            <a:schemeClr val="accent1"/>
+          </a:effectRef>
+          <a:fontRef idx="minor">
+            <a:schemeClr val="lt1"/>
+          </a:fontRef>
+        </p:style>
+        <p:txBody>
+          <a:bodyPr rtlCol="0" anchor="ctr"/>
+          <a:lstStyle/>
+          <a:p>
+            <a:pPr algn="ctr"/>
+            <a:endParaRPr lang="pt-BR"/>
+          </a:p>
+        </p:txBody>
+      </p:sp>
+      <p:sp>
+        <p:nvSpPr>
+          <p:cNvPr id="9" name="Rectangle 8">
+            <a:extLst>
+              <a:ext uri="{FF2B5EF4-FFF2-40B4-BE49-F238E27FC236}">
+                <a16:creationId xmlns:a16="http://schemas.microsoft.com/office/drawing/2014/main" id="{2EB87A5E-14C2-6364-B4A7-461BB75E9120}"/>
+              </a:ext>
+            </a:extLst>
+          </p:cNvPr>
+          <p:cNvSpPr/>
+          <p:nvPr/>
+        </p:nvSpPr>
+        <p:spPr>
+          <a:xfrm>
+            <a:off x="8077200" y="3962400"/>
+            <a:ext cx="1803400" cy="2260600"/>
+          </a:xfrm>
+          <a:prstGeom prst="rect">
+            <a:avLst/>
+          </a:prstGeom>
+          <a:solidFill>
+            <a:srgbClr val="AD9369"/>
+          </a:solidFill>
+          <a:ln>
+            <a:noFill/>
+          </a:ln>
+        </p:spPr>
+        <p:style>
+          <a:lnRef idx="2">
+            <a:schemeClr val="accent1">
+              <a:shade val="15000"/>
+            </a:schemeClr>
+          </a:lnRef>
+          <a:fillRef idx="1">
+            <a:schemeClr val="accent1"/>
+          </a:fillRef>
+          <a:effectRef idx="0">
+            <a:schemeClr val="accent1"/>
+          </a:effectRef>
+          <a:fontRef idx="minor">
+            <a:schemeClr val="lt1"/>
+          </a:fontRef>
+        </p:style>
+        <p:txBody>
+          <a:bodyPr rtlCol="0" anchor="ctr"/>
+          <a:lstStyle/>
+          <a:p>
+            <a:pPr algn="ctr"/>
+            <a:endParaRPr lang="pt-BR"/>
+          </a:p>
+        </p:txBody>
+      </p:sp>
+    </p:spTree>
+    <p:extLst>
+      <p:ext uri="{BB962C8B-B14F-4D97-AF65-F5344CB8AC3E}">
+        <p14:creationId xmlns:p14="http://schemas.microsoft.com/office/powerpoint/2010/main" val="1286325922"/>
+      </p:ext>
+    </p:extLst>
+  </p:cSld>
+  <p:clrMapOvr>
+    <a:masterClrMapping/>
+  </p:clrMapOvr>
+</p:sld>
+</file>
+
+<file path=ppt/slides/slide5.xml><?xml version="1.0" encoding="utf-8"?>
+<p:sld xmlns:a="http://schemas.openxmlformats.org/drawingml/2006/main" xmlns:r="http://schemas.openxmlformats.org/officeDocument/2006/relationships" xmlns:p="http://schemas.openxmlformats.org/presentationml/2006/main">
+  <p:cSld>
+    <p:bg>
+      <p:bgPr>
+        <a:solidFill>
+          <a:srgbClr val="FAF8F6"/>
+        </a:solidFill>
+        <a:effectLst/>
+      </p:bgPr>
+    </p:bg>
+    <p:spTree>
+      <p:nvGrpSpPr>
+        <p:cNvPr id="1" name="">
+          <a:extLst>
+            <a:ext uri="{FF2B5EF4-FFF2-40B4-BE49-F238E27FC236}">
+              <a16:creationId xmlns:a16="http://schemas.microsoft.com/office/drawing/2014/main" id="{6D4B236D-1554-B54C-309B-950203D476CC}"/>
+            </a:ext>
+          </a:extLst>
+        </p:cNvPr>
+        <p:cNvGrpSpPr/>
+        <p:nvPr/>
+      </p:nvGrpSpPr>
+      <p:grpSpPr>
+        <a:xfrm>
+          <a:off x="0" y="0"/>
+          <a:ext cx="0" cy="0"/>
+          <a:chOff x="0" y="0"/>
+          <a:chExt cx="0" cy="0"/>
+        </a:xfrm>
+      </p:grpSpPr>
+      <p:sp>
+        <p:nvSpPr>
+          <p:cNvPr id="2" name="Title 1">
+            <a:extLst>
+              <a:ext uri="{FF2B5EF4-FFF2-40B4-BE49-F238E27FC236}">
+                <a16:creationId xmlns:a16="http://schemas.microsoft.com/office/drawing/2014/main" id="{22CE524F-9B0B-F302-A08F-49BAE437D494}"/>
+              </a:ext>
+            </a:extLst>
+          </p:cNvPr>
+          <p:cNvSpPr>
+            <a:spLocks noGrp="1"/>
+          </p:cNvSpPr>
+          <p:nvPr>
+            <p:ph type="title"/>
+          </p:nvPr>
+        </p:nvSpPr>
+        <p:spPr>
+          <a:xfrm>
+            <a:off x="913795" y="51435"/>
+            <a:ext cx="10353762" cy="1383030"/>
+          </a:xfrm>
+        </p:spPr>
+        <p:txBody>
+          <a:bodyPr/>
+          <a:lstStyle/>
+          <a:p>
+            <a:r>
+              <a:rPr lang="pt-BR" dirty="0">
+                <a:solidFill>
+                  <a:schemeClr val="bg1"/>
+                </a:solidFill>
+              </a:rPr>
+              <a:t>Azul Elétrico, o toque de energia</a:t>
+            </a:r>
+          </a:p>
+        </p:txBody>
+      </p:sp>
+      <p:sp>
+        <p:nvSpPr>
+          <p:cNvPr id="3" name="Content Placeholder 2">
+            <a:extLst>
+              <a:ext uri="{FF2B5EF4-FFF2-40B4-BE49-F238E27FC236}">
+                <a16:creationId xmlns:a16="http://schemas.microsoft.com/office/drawing/2014/main" id="{805E4C5B-F582-EBBA-6D65-CA303285836B}"/>
+              </a:ext>
+            </a:extLst>
+          </p:cNvPr>
+          <p:cNvSpPr>
+            <a:spLocks noGrp="1"/>
+          </p:cNvSpPr>
+          <p:nvPr>
+            <p:ph idx="1"/>
+          </p:nvPr>
+        </p:nvSpPr>
+        <p:spPr>
+          <a:xfrm>
+            <a:off x="913795" y="1482726"/>
+            <a:ext cx="10353762" cy="2165348"/>
+          </a:xfrm>
+        </p:spPr>
+        <p:txBody>
+          <a:bodyPr>
+            <a:normAutofit/>
+          </a:bodyPr>
+          <a:lstStyle/>
+          <a:p>
+            <a:pPr marL="36900" indent="0">
+              <a:buNone/>
+            </a:pPr>
+            <a:r>
+              <a:rPr lang="pt-BR" dirty="0">
+                <a:solidFill>
+                  <a:schemeClr val="bg1"/>
+                </a:solidFill>
+                <a:effectLst/>
+              </a:rPr>
+              <a:t>Um azul vibrante foi reservado para momentos de destaque pontual: um botão urgente, um </a:t>
+            </a:r>
+            <a:r>
+              <a:rPr lang="pt-BR" dirty="0" err="1">
+                <a:solidFill>
+                  <a:schemeClr val="bg1"/>
+                </a:solidFill>
+                <a:effectLst/>
+              </a:rPr>
+              <a:t>badge</a:t>
+            </a:r>
+            <a:r>
+              <a:rPr lang="pt-BR" dirty="0">
+                <a:solidFill>
+                  <a:schemeClr val="bg1"/>
+                </a:solidFill>
+                <a:effectLst/>
+              </a:rPr>
+              <a:t> de notícia nova, uma chamada para ação que precisa saltar da tela. É a cor da inovação e da </a:t>
+            </a:r>
+            <a:r>
+              <a:rPr lang="pt-BR" u="sng" dirty="0">
+                <a:solidFill>
+                  <a:schemeClr val="bg1"/>
+                </a:solidFill>
+                <a:effectLst/>
+              </a:rPr>
+              <a:t>energia elétrica</a:t>
+            </a:r>
+            <a:r>
+              <a:rPr lang="pt-BR" dirty="0">
+                <a:solidFill>
+                  <a:schemeClr val="bg1"/>
+                </a:solidFill>
+                <a:effectLst/>
+              </a:rPr>
+              <a:t>, literalmente. Deve ser usado com moderação: quando aparece, precisa significar algo.</a:t>
+            </a:r>
+          </a:p>
+        </p:txBody>
+      </p:sp>
+      <p:sp>
+        <p:nvSpPr>
+          <p:cNvPr id="4" name="Rectangle 3">
+            <a:extLst>
+              <a:ext uri="{FF2B5EF4-FFF2-40B4-BE49-F238E27FC236}">
+                <a16:creationId xmlns:a16="http://schemas.microsoft.com/office/drawing/2014/main" id="{22BAD18A-1A37-9825-5394-28FAFE110327}"/>
+              </a:ext>
+            </a:extLst>
+          </p:cNvPr>
+          <p:cNvSpPr/>
+          <p:nvPr/>
+        </p:nvSpPr>
+        <p:spPr>
+          <a:xfrm>
+            <a:off x="1282700" y="3898900"/>
+            <a:ext cx="1803400" cy="2260600"/>
+          </a:xfrm>
+          <a:prstGeom prst="rect">
+            <a:avLst/>
+          </a:prstGeom>
+          <a:solidFill>
+            <a:srgbClr val="214B71"/>
+          </a:solidFill>
+          <a:ln>
+            <a:noFill/>
+          </a:ln>
+        </p:spPr>
+        <p:style>
+          <a:lnRef idx="2">
+            <a:schemeClr val="accent1">
+              <a:shade val="15000"/>
+            </a:schemeClr>
+          </a:lnRef>
+          <a:fillRef idx="1">
+            <a:schemeClr val="accent1"/>
+          </a:fillRef>
+          <a:effectRef idx="0">
+            <a:schemeClr val="accent1"/>
+          </a:effectRef>
+          <a:fontRef idx="minor">
+            <a:schemeClr val="lt1"/>
+          </a:fontRef>
+        </p:style>
+        <p:txBody>
+          <a:bodyPr rtlCol="0" anchor="ctr"/>
+          <a:lstStyle/>
+          <a:p>
+            <a:pPr algn="ctr"/>
+            <a:endParaRPr lang="pt-BR"/>
+          </a:p>
+        </p:txBody>
+      </p:sp>
+      <p:sp>
+        <p:nvSpPr>
+          <p:cNvPr id="6" name="Rectangle 5">
+            <a:extLst>
+              <a:ext uri="{FF2B5EF4-FFF2-40B4-BE49-F238E27FC236}">
+                <a16:creationId xmlns:a16="http://schemas.microsoft.com/office/drawing/2014/main" id="{F2CF80F8-CB14-29F4-0F7A-EA90FE53CE08}"/>
+              </a:ext>
+            </a:extLst>
+          </p:cNvPr>
+          <p:cNvSpPr/>
+          <p:nvPr/>
+        </p:nvSpPr>
+        <p:spPr>
+          <a:xfrm>
+            <a:off x="3263900" y="3898900"/>
+            <a:ext cx="1803400" cy="2260600"/>
+          </a:xfrm>
+          <a:prstGeom prst="rect">
+            <a:avLst/>
+          </a:prstGeom>
+          <a:solidFill>
+            <a:srgbClr val="242B38"/>
+          </a:solidFill>
+          <a:ln>
+            <a:noFill/>
+          </a:ln>
+        </p:spPr>
+        <p:style>
+          <a:lnRef idx="2">
+            <a:schemeClr val="accent1">
+              <a:shade val="15000"/>
+            </a:schemeClr>
+          </a:lnRef>
+          <a:fillRef idx="1">
+            <a:schemeClr val="accent1"/>
+          </a:fillRef>
+          <a:effectRef idx="0">
+            <a:schemeClr val="accent1"/>
+          </a:effectRef>
+          <a:fontRef idx="minor">
+            <a:schemeClr val="lt1"/>
+          </a:fontRef>
+        </p:style>
+        <p:txBody>
+          <a:bodyPr rtlCol="0" anchor="ctr"/>
+          <a:lstStyle/>
+          <a:p>
+            <a:pPr algn="ctr"/>
+            <a:endParaRPr lang="pt-BR"/>
+          </a:p>
+        </p:txBody>
+      </p:sp>
+      <p:sp>
+        <p:nvSpPr>
+          <p:cNvPr id="8" name="Rectangle 7">
+            <a:extLst>
+              <a:ext uri="{FF2B5EF4-FFF2-40B4-BE49-F238E27FC236}">
+                <a16:creationId xmlns:a16="http://schemas.microsoft.com/office/drawing/2014/main" id="{0EB2B37D-5A13-0469-14EC-AB192B0C1C01}"/>
+              </a:ext>
+            </a:extLst>
+          </p:cNvPr>
+          <p:cNvSpPr/>
+          <p:nvPr/>
+        </p:nvSpPr>
+        <p:spPr>
+          <a:xfrm>
+            <a:off x="5245100" y="3898900"/>
+            <a:ext cx="1803400" cy="2260600"/>
+          </a:xfrm>
+          <a:prstGeom prst="rect">
+            <a:avLst/>
+          </a:prstGeom>
+          <a:solidFill>
+            <a:srgbClr val="D4BF90"/>
+          </a:solidFill>
+          <a:ln>
+            <a:noFill/>
+          </a:ln>
+        </p:spPr>
+        <p:style>
+          <a:lnRef idx="2">
+            <a:schemeClr val="accent1">
+              <a:shade val="15000"/>
+            </a:schemeClr>
+          </a:lnRef>
+          <a:fillRef idx="1">
+            <a:schemeClr val="accent1"/>
+          </a:fillRef>
+          <a:effectRef idx="0">
+            <a:schemeClr val="accent1"/>
+          </a:effectRef>
+          <a:fontRef idx="minor">
+            <a:schemeClr val="lt1"/>
+          </a:fontRef>
+        </p:style>
+        <p:txBody>
+          <a:bodyPr rtlCol="0" anchor="ctr"/>
+          <a:lstStyle/>
+          <a:p>
+            <a:pPr algn="ctr"/>
+            <a:endParaRPr lang="pt-BR"/>
+          </a:p>
+        </p:txBody>
+      </p:sp>
+      <p:sp>
+        <p:nvSpPr>
+          <p:cNvPr id="9" name="Rectangle 8">
+            <a:extLst>
+              <a:ext uri="{FF2B5EF4-FFF2-40B4-BE49-F238E27FC236}">
+                <a16:creationId xmlns:a16="http://schemas.microsoft.com/office/drawing/2014/main" id="{E88A97E2-7D5B-4C77-2D0F-14A9C6B19101}"/>
+              </a:ext>
+            </a:extLst>
+          </p:cNvPr>
+          <p:cNvSpPr/>
+          <p:nvPr/>
+        </p:nvSpPr>
+        <p:spPr>
+          <a:xfrm>
+            <a:off x="7226300" y="3898900"/>
+            <a:ext cx="1803400" cy="2260600"/>
+          </a:xfrm>
+          <a:prstGeom prst="rect">
+            <a:avLst/>
+          </a:prstGeom>
+          <a:solidFill>
+            <a:srgbClr val="AD9369"/>
+          </a:solidFill>
+          <a:ln>
+            <a:noFill/>
+          </a:ln>
+        </p:spPr>
+        <p:style>
+          <a:lnRef idx="2">
+            <a:schemeClr val="accent1">
+              <a:shade val="15000"/>
+            </a:schemeClr>
+          </a:lnRef>
+          <a:fillRef idx="1">
+            <a:schemeClr val="accent1"/>
+          </a:fillRef>
+          <a:effectRef idx="0">
+            <a:schemeClr val="accent1"/>
+          </a:effectRef>
+          <a:fontRef idx="minor">
+            <a:schemeClr val="lt1"/>
+          </a:fontRef>
+        </p:style>
+        <p:txBody>
+          <a:bodyPr rtlCol="0" anchor="ctr"/>
+          <a:lstStyle/>
+          <a:p>
+            <a:pPr algn="ctr"/>
+            <a:endParaRPr lang="pt-BR"/>
+          </a:p>
+        </p:txBody>
+      </p:sp>
+      <p:sp>
+        <p:nvSpPr>
+          <p:cNvPr id="7" name="Rectangle 6">
+            <a:extLst>
+              <a:ext uri="{FF2B5EF4-FFF2-40B4-BE49-F238E27FC236}">
+                <a16:creationId xmlns:a16="http://schemas.microsoft.com/office/drawing/2014/main" id="{3A85349E-F4D4-2C2F-7D33-B1C8226CA573}"/>
+              </a:ext>
+            </a:extLst>
+          </p:cNvPr>
+          <p:cNvSpPr/>
+          <p:nvPr/>
+        </p:nvSpPr>
+        <p:spPr>
+          <a:xfrm>
+            <a:off x="9207500" y="3898900"/>
+            <a:ext cx="1803400" cy="2260600"/>
+          </a:xfrm>
+          <a:prstGeom prst="rect">
+            <a:avLst/>
+          </a:prstGeom>
+          <a:solidFill>
+            <a:srgbClr val="2061DF"/>
+          </a:solidFill>
+          <a:ln>
+            <a:noFill/>
+          </a:ln>
+        </p:spPr>
+        <p:style>
+          <a:lnRef idx="2">
+            <a:schemeClr val="accent1">
+              <a:shade val="15000"/>
+            </a:schemeClr>
+          </a:lnRef>
+          <a:fillRef idx="1">
+            <a:schemeClr val="accent1"/>
+          </a:fillRef>
+          <a:effectRef idx="0">
+            <a:schemeClr val="accent1"/>
+          </a:effectRef>
+          <a:fontRef idx="minor">
+            <a:schemeClr val="lt1"/>
+          </a:fontRef>
+        </p:style>
+        <p:txBody>
+          <a:bodyPr rtlCol="0" anchor="ctr"/>
+          <a:lstStyle/>
+          <a:p>
+            <a:pPr algn="ctr"/>
+            <a:endParaRPr lang="pt-BR"/>
+          </a:p>
+        </p:txBody>
+      </p:sp>
+    </p:spTree>
+    <p:extLst>
+      <p:ext uri="{BB962C8B-B14F-4D97-AF65-F5344CB8AC3E}">
+        <p14:creationId xmlns:p14="http://schemas.microsoft.com/office/powerpoint/2010/main" val="2986111372"/>
+      </p:ext>
+    </p:extLst>
+  </p:cSld>
+  <p:clrMapOvr>
+    <a:masterClrMapping/>
+  </p:clrMapOvr>
+</p:sld>
+</file>
+
+<file path=ppt/slides/slide6.xml><?xml version="1.0" encoding="utf-8"?>
+<p:sld xmlns:a="http://schemas.openxmlformats.org/drawingml/2006/main" xmlns:r="http://schemas.openxmlformats.org/officeDocument/2006/relationships" xmlns:p="http://schemas.openxmlformats.org/presentationml/2006/main">
+  <p:cSld>
+    <p:bg>
+      <p:bgPr>
+        <a:solidFill>
+          <a:srgbClr val="FAF8F6"/>
+        </a:solidFill>
+        <a:effectLst/>
+      </p:bgPr>
+    </p:bg>
+    <p:spTree>
+      <p:nvGrpSpPr>
+        <p:cNvPr id="1" name="">
+          <a:extLst>
+            <a:ext uri="{FF2B5EF4-FFF2-40B4-BE49-F238E27FC236}">
+              <a16:creationId xmlns:a16="http://schemas.microsoft.com/office/drawing/2014/main" id="{EC3CED73-305A-8640-17E7-7F0C32B1C5F0}"/>
+            </a:ext>
+          </a:extLst>
+        </p:cNvPr>
+        <p:cNvGrpSpPr/>
+        <p:nvPr/>
+      </p:nvGrpSpPr>
+      <p:grpSpPr>
+        <a:xfrm>
+          <a:off x="0" y="0"/>
+          <a:ext cx="0" cy="0"/>
+          <a:chOff x="0" y="0"/>
+          <a:chExt cx="0" cy="0"/>
+        </a:xfrm>
+      </p:grpSpPr>
+      <p:sp>
+        <p:nvSpPr>
+          <p:cNvPr id="2" name="Title 1">
+            <a:extLst>
+              <a:ext uri="{FF2B5EF4-FFF2-40B4-BE49-F238E27FC236}">
+                <a16:creationId xmlns:a16="http://schemas.microsoft.com/office/drawing/2014/main" id="{84D537EB-9CCF-3FB0-E2F9-3390A4044AA1}"/>
+              </a:ext>
+            </a:extLst>
+          </p:cNvPr>
+          <p:cNvSpPr>
+            <a:spLocks noGrp="1"/>
+          </p:cNvSpPr>
+          <p:nvPr>
+            <p:ph type="title"/>
+          </p:nvPr>
+        </p:nvSpPr>
+        <p:spPr>
+          <a:xfrm>
+            <a:off x="913795" y="51435"/>
+            <a:ext cx="10353762" cy="1383030"/>
+          </a:xfrm>
+        </p:spPr>
+        <p:txBody>
+          <a:bodyPr/>
+          <a:lstStyle/>
+          <a:p>
+            <a:r>
+              <a:rPr lang="pt-BR" dirty="0">
+                <a:solidFill>
+                  <a:schemeClr val="bg1"/>
+                </a:solidFill>
+              </a:rPr>
+              <a:t>Cores neutras</a:t>
+            </a:r>
+          </a:p>
+        </p:txBody>
+      </p:sp>
+      <p:sp>
+        <p:nvSpPr>
+          <p:cNvPr id="3" name="Content Placeholder 2">
+            <a:extLst>
+              <a:ext uri="{FF2B5EF4-FFF2-40B4-BE49-F238E27FC236}">
+                <a16:creationId xmlns:a16="http://schemas.microsoft.com/office/drawing/2014/main" id="{17DABCAA-F20F-FC49-FDCA-211A2AAF61D9}"/>
+              </a:ext>
+            </a:extLst>
+          </p:cNvPr>
+          <p:cNvSpPr>
+            <a:spLocks noGrp="1"/>
+          </p:cNvSpPr>
+          <p:nvPr>
+            <p:ph idx="1"/>
+          </p:nvPr>
+        </p:nvSpPr>
+        <p:spPr>
+          <a:xfrm>
+            <a:off x="913795" y="1482726"/>
+            <a:ext cx="10353762" cy="2165348"/>
+          </a:xfrm>
+        </p:spPr>
+        <p:txBody>
+          <a:bodyPr>
+            <a:normAutofit/>
+          </a:bodyPr>
+          <a:lstStyle/>
+          <a:p>
+            <a:pPr marL="36900" indent="0">
+              <a:buNone/>
+            </a:pPr>
+            <a:r>
+              <a:rPr lang="pt-BR" dirty="0">
+                <a:solidFill>
+                  <a:schemeClr val="bg1"/>
+                </a:solidFill>
+                <a:effectLst/>
+              </a:rPr>
+              <a:t>Toda paleta precisa de um palco limpo onde as cores protagonistas possam brilhar. O fundo claro quase branco dá respiro e elegância às páginas. O cinza cria as linhas finas que organizam conteúdo sem pesar. O carvão é a cor dos textos corridos, escuro o suficiente para boa leitura, mas leve o suficiente para não cansar. E o branco puro aparece em cards e superfícies que precisam de destaque.</a:t>
+            </a:r>
+          </a:p>
+        </p:txBody>
+      </p:sp>
+      <p:sp>
+        <p:nvSpPr>
+          <p:cNvPr id="8" name="Rectangle 7">
+            <a:extLst>
+              <a:ext uri="{FF2B5EF4-FFF2-40B4-BE49-F238E27FC236}">
+                <a16:creationId xmlns:a16="http://schemas.microsoft.com/office/drawing/2014/main" id="{7C7D417B-B680-D41D-0F22-64F6BC8F2673}"/>
+              </a:ext>
+            </a:extLst>
+          </p:cNvPr>
+          <p:cNvSpPr/>
+          <p:nvPr/>
+        </p:nvSpPr>
+        <p:spPr>
+          <a:xfrm>
+            <a:off x="4597400" y="3898900"/>
+            <a:ext cx="3187700" cy="2260600"/>
+          </a:xfrm>
+          <a:prstGeom prst="rect">
+            <a:avLst/>
+          </a:prstGeom>
+          <a:solidFill>
+            <a:srgbClr val="D6D6D5"/>
+          </a:solidFill>
+          <a:ln>
+            <a:noFill/>
+          </a:ln>
+        </p:spPr>
+        <p:style>
+          <a:lnRef idx="2">
+            <a:schemeClr val="accent1">
+              <a:shade val="15000"/>
+            </a:schemeClr>
+          </a:lnRef>
+          <a:fillRef idx="1">
+            <a:schemeClr val="accent1"/>
+          </a:fillRef>
+          <a:effectRef idx="0">
+            <a:schemeClr val="accent1"/>
+          </a:effectRef>
+          <a:fontRef idx="minor">
+            <a:schemeClr val="lt1"/>
+          </a:fontRef>
+        </p:style>
+        <p:txBody>
+          <a:bodyPr rtlCol="0" anchor="ctr"/>
+          <a:lstStyle/>
+          <a:p>
+            <a:pPr algn="ctr"/>
+            <a:endParaRPr lang="pt-BR"/>
+          </a:p>
+        </p:txBody>
+      </p:sp>
+      <p:sp>
+        <p:nvSpPr>
+          <p:cNvPr id="10" name="Rectangle 9">
+            <a:extLst>
+              <a:ext uri="{FF2B5EF4-FFF2-40B4-BE49-F238E27FC236}">
+                <a16:creationId xmlns:a16="http://schemas.microsoft.com/office/drawing/2014/main" id="{C3C95953-9098-CC6E-CD8E-3421BB7C9CA0}"/>
+              </a:ext>
+            </a:extLst>
+          </p:cNvPr>
+          <p:cNvSpPr/>
+          <p:nvPr/>
+        </p:nvSpPr>
+        <p:spPr>
+          <a:xfrm>
+            <a:off x="1282700" y="3898900"/>
+            <a:ext cx="3187700" cy="2260600"/>
+          </a:xfrm>
+          <a:prstGeom prst="rect">
+            <a:avLst/>
+          </a:prstGeom>
+          <a:solidFill>
+            <a:srgbClr val="F5F1EC"/>
+          </a:solidFill>
+          <a:ln>
+            <a:solidFill>
+              <a:schemeClr val="bg1"/>
+            </a:solidFill>
+          </a:ln>
+        </p:spPr>
+        <p:style>
+          <a:lnRef idx="2">
+            <a:schemeClr val="accent1">
+              <a:shade val="15000"/>
+            </a:schemeClr>
+          </a:lnRef>
+          <a:fillRef idx="1">
+            <a:schemeClr val="accent1"/>
+          </a:fillRef>
+          <a:effectRef idx="0">
+            <a:schemeClr val="accent1"/>
+          </a:effectRef>
+          <a:fontRef idx="minor">
+            <a:schemeClr val="lt1"/>
+          </a:fontRef>
+        </p:style>
+        <p:txBody>
+          <a:bodyPr rtlCol="0" anchor="ctr"/>
+          <a:lstStyle/>
+          <a:p>
+            <a:pPr algn="ctr"/>
+            <a:endParaRPr lang="pt-BR"/>
+          </a:p>
+        </p:txBody>
+      </p:sp>
+      <p:sp>
+        <p:nvSpPr>
+          <p:cNvPr id="11" name="Rectangle 10">
+            <a:extLst>
+              <a:ext uri="{FF2B5EF4-FFF2-40B4-BE49-F238E27FC236}">
+                <a16:creationId xmlns:a16="http://schemas.microsoft.com/office/drawing/2014/main" id="{57A6D9FC-D03A-200B-DF56-CB0F8FCBE840}"/>
+              </a:ext>
+            </a:extLst>
+          </p:cNvPr>
+          <p:cNvSpPr/>
+          <p:nvPr/>
+        </p:nvSpPr>
+        <p:spPr>
+          <a:xfrm>
+            <a:off x="7912100" y="3898900"/>
+            <a:ext cx="3187700" cy="2260600"/>
+          </a:xfrm>
+          <a:prstGeom prst="rect">
+            <a:avLst/>
+          </a:prstGeom>
+          <a:solidFill>
+            <a:srgbClr val="3C3D3C"/>
+          </a:solidFill>
+          <a:ln>
+            <a:noFill/>
+          </a:ln>
+        </p:spPr>
+        <p:style>
+          <a:lnRef idx="2">
+            <a:schemeClr val="accent1">
+              <a:shade val="15000"/>
+            </a:schemeClr>
+          </a:lnRef>
+          <a:fillRef idx="1">
+            <a:schemeClr val="accent1"/>
+          </a:fillRef>
+          <a:effectRef idx="0">
+            <a:schemeClr val="accent1"/>
+          </a:effectRef>
+          <a:fontRef idx="minor">
+            <a:schemeClr val="lt1"/>
+          </a:fontRef>
+        </p:style>
+        <p:txBody>
+          <a:bodyPr rtlCol="0" anchor="ctr"/>
+          <a:lstStyle/>
+          <a:p>
+            <a:pPr algn="ctr"/>
+            <a:endParaRPr lang="pt-BR"/>
+          </a:p>
+        </p:txBody>
+      </p:sp>
+    </p:spTree>
+    <p:extLst>
+      <p:ext uri="{BB962C8B-B14F-4D97-AF65-F5344CB8AC3E}">
+        <p14:creationId xmlns:p14="http://schemas.microsoft.com/office/powerpoint/2010/main" val="1310156537"/>
+      </p:ext>
+    </p:extLst>
+  </p:cSld>
+  <p:clrMapOvr>
+    <a:masterClrMapping/>
+  </p:clrMapOvr>
+</p:sld>
+</file>
+
+<file path=ppt/slides/slide7.xml><?xml version="1.0" encoding="utf-8"?>
+<p:sld xmlns:a="http://schemas.openxmlformats.org/drawingml/2006/main" xmlns:r="http://schemas.openxmlformats.org/officeDocument/2006/relationships" xmlns:p="http://schemas.openxmlformats.org/presentationml/2006/main">
+  <p:cSld>
+    <p:bg>
+      <p:bgPr>
+        <a:solidFill>
+          <a:srgbClr val="FAF8F6"/>
+        </a:solidFill>
+        <a:effectLst/>
+      </p:bgPr>
+    </p:bg>
+    <p:spTree>
+      <p:nvGrpSpPr>
+        <p:cNvPr id="1" name="">
+          <a:extLst>
+            <a:ext uri="{FF2B5EF4-FFF2-40B4-BE49-F238E27FC236}">
+              <a16:creationId xmlns:a16="http://schemas.microsoft.com/office/drawing/2014/main" id="{FBC86B4E-8586-5A26-0F21-9ACC98FED787}"/>
+            </a:ext>
+          </a:extLst>
+        </p:cNvPr>
+        <p:cNvGrpSpPr/>
+        <p:nvPr/>
+      </p:nvGrpSpPr>
+      <p:grpSpPr>
+        <a:xfrm>
+          <a:off x="0" y="0"/>
+          <a:ext cx="0" cy="0"/>
+          <a:chOff x="0" y="0"/>
+          <a:chExt cx="0" cy="0"/>
+        </a:xfrm>
+      </p:grpSpPr>
+      <p:sp>
+        <p:nvSpPr>
+          <p:cNvPr id="2" name="Title 1">
+            <a:extLst>
+              <a:ext uri="{FF2B5EF4-FFF2-40B4-BE49-F238E27FC236}">
+                <a16:creationId xmlns:a16="http://schemas.microsoft.com/office/drawing/2014/main" id="{88089D25-3E20-5F79-8592-93E7B0D60787}"/>
+              </a:ext>
+            </a:extLst>
+          </p:cNvPr>
+          <p:cNvSpPr>
+            <a:spLocks noGrp="1"/>
+          </p:cNvSpPr>
+          <p:nvPr>
+            <p:ph type="title"/>
+          </p:nvPr>
+        </p:nvSpPr>
+        <p:spPr>
+          <a:xfrm>
+            <a:off x="913795" y="51435"/>
+            <a:ext cx="10353762" cy="1383030"/>
+          </a:xfrm>
+        </p:spPr>
+        <p:txBody>
+          <a:bodyPr/>
+          <a:lstStyle/>
+          <a:p>
+            <a:r>
+              <a:rPr lang="pt-BR" dirty="0">
+                <a:solidFill>
+                  <a:schemeClr val="bg1"/>
+                </a:solidFill>
+              </a:rPr>
+              <a:t>Paleta de Cores ASSOGW</a:t>
+            </a:r>
+          </a:p>
+        </p:txBody>
+      </p:sp>
+      <p:sp>
+        <p:nvSpPr>
+          <p:cNvPr id="8" name="Rectangle 7">
+            <a:extLst>
+              <a:ext uri="{FF2B5EF4-FFF2-40B4-BE49-F238E27FC236}">
+                <a16:creationId xmlns:a16="http://schemas.microsoft.com/office/drawing/2014/main" id="{C7A428C9-EBF7-AE13-5093-D689D67F854F}"/>
+              </a:ext>
+            </a:extLst>
+          </p:cNvPr>
+          <p:cNvSpPr/>
+          <p:nvPr/>
+        </p:nvSpPr>
+        <p:spPr>
+          <a:xfrm>
+            <a:off x="4597400" y="3898900"/>
+            <a:ext cx="3187700" cy="2260600"/>
+          </a:xfrm>
+          <a:prstGeom prst="rect">
+            <a:avLst/>
+          </a:prstGeom>
+          <a:solidFill>
+            <a:srgbClr val="D6D6D5"/>
+          </a:solidFill>
+          <a:ln>
+            <a:noFill/>
+          </a:ln>
+        </p:spPr>
+        <p:style>
+          <a:lnRef idx="2">
+            <a:schemeClr val="accent1">
+              <a:shade val="15000"/>
+            </a:schemeClr>
+          </a:lnRef>
+          <a:fillRef idx="1">
+            <a:schemeClr val="accent1"/>
+          </a:fillRef>
+          <a:effectRef idx="0">
+            <a:schemeClr val="accent1"/>
+          </a:effectRef>
+          <a:fontRef idx="minor">
+            <a:schemeClr val="lt1"/>
+          </a:fontRef>
+        </p:style>
+        <p:txBody>
+          <a:bodyPr rtlCol="0" anchor="b"/>
+          <a:lstStyle/>
+          <a:p>
+            <a:pPr algn="ctr"/>
+            <a:r>
+              <a:rPr lang="pt-BR" dirty="0">
+                <a:solidFill>
+                  <a:schemeClr val="bg1"/>
+                </a:solidFill>
+              </a:rPr>
+              <a:t>#D6D6D6</a:t>
+            </a:r>
+          </a:p>
+        </p:txBody>
+      </p:sp>
+      <p:sp>
+        <p:nvSpPr>
+          <p:cNvPr id="10" name="Rectangle 9">
+            <a:extLst>
+              <a:ext uri="{FF2B5EF4-FFF2-40B4-BE49-F238E27FC236}">
+                <a16:creationId xmlns:a16="http://schemas.microsoft.com/office/drawing/2014/main" id="{2CBE115C-6EEA-31B9-6E56-C6A142FFCB3C}"/>
+              </a:ext>
+            </a:extLst>
+          </p:cNvPr>
+          <p:cNvSpPr/>
+          <p:nvPr/>
+        </p:nvSpPr>
+        <p:spPr>
+          <a:xfrm>
+            <a:off x="1282700" y="3898900"/>
+            <a:ext cx="3187700" cy="2260600"/>
+          </a:xfrm>
+          <a:prstGeom prst="rect">
+            <a:avLst/>
+          </a:prstGeom>
+          <a:solidFill>
+            <a:srgbClr val="F5F1EC"/>
+          </a:solidFill>
+          <a:ln>
+            <a:solidFill>
+              <a:schemeClr val="bg1"/>
+            </a:solidFill>
+          </a:ln>
+        </p:spPr>
+        <p:style>
+          <a:lnRef idx="2">
+            <a:schemeClr val="accent1">
+              <a:shade val="15000"/>
+            </a:schemeClr>
+          </a:lnRef>
+          <a:fillRef idx="1">
+            <a:schemeClr val="accent1"/>
+          </a:fillRef>
+          <a:effectRef idx="0">
+            <a:schemeClr val="accent1"/>
+          </a:effectRef>
+          <a:fontRef idx="minor">
+            <a:schemeClr val="lt1"/>
+          </a:fontRef>
+        </p:style>
+        <p:txBody>
+          <a:bodyPr rtlCol="0" anchor="b"/>
+          <a:lstStyle/>
+          <a:p>
+            <a:pPr algn="ctr"/>
+            <a:r>
+              <a:rPr lang="pt-BR" dirty="0">
+                <a:solidFill>
+                  <a:schemeClr val="bg1"/>
+                </a:solidFill>
+              </a:rPr>
+              <a:t>#F7F6F3</a:t>
+            </a:r>
+          </a:p>
+        </p:txBody>
+      </p:sp>
+      <p:sp>
+        <p:nvSpPr>
+          <p:cNvPr id="11" name="Rectangle 10">
+            <a:extLst>
+              <a:ext uri="{FF2B5EF4-FFF2-40B4-BE49-F238E27FC236}">
+                <a16:creationId xmlns:a16="http://schemas.microsoft.com/office/drawing/2014/main" id="{C8DA73EE-8C99-6103-4A38-E14999C32FD0}"/>
+              </a:ext>
+            </a:extLst>
+          </p:cNvPr>
+          <p:cNvSpPr/>
+          <p:nvPr/>
+        </p:nvSpPr>
+        <p:spPr>
+          <a:xfrm>
+            <a:off x="7912100" y="3898900"/>
+            <a:ext cx="3187700" cy="2260600"/>
+          </a:xfrm>
+          <a:prstGeom prst="rect">
+            <a:avLst/>
+          </a:prstGeom>
+          <a:solidFill>
+            <a:srgbClr val="3C3D3C"/>
+          </a:solidFill>
+          <a:ln>
+            <a:noFill/>
+          </a:ln>
+        </p:spPr>
+        <p:style>
+          <a:lnRef idx="2">
+            <a:schemeClr val="accent1">
+              <a:shade val="15000"/>
+            </a:schemeClr>
+          </a:lnRef>
+          <a:fillRef idx="1">
+            <a:schemeClr val="accent1"/>
+          </a:fillRef>
+          <a:effectRef idx="0">
+            <a:schemeClr val="accent1"/>
+          </a:effectRef>
+          <a:fontRef idx="minor">
+            <a:schemeClr val="lt1"/>
+          </a:fontRef>
+        </p:style>
+        <p:txBody>
+          <a:bodyPr rtlCol="0" anchor="b"/>
+          <a:lstStyle/>
+          <a:p>
+            <a:pPr algn="ctr"/>
+            <a:r>
+              <a:rPr lang="pt-BR" dirty="0"/>
+              <a:t>#2E2E2E</a:t>
+            </a:r>
+          </a:p>
+        </p:txBody>
+      </p:sp>
+      <p:sp>
+        <p:nvSpPr>
+          <p:cNvPr id="6" name="Rectangle 5">
+            <a:extLst>
+              <a:ext uri="{FF2B5EF4-FFF2-40B4-BE49-F238E27FC236}">
+                <a16:creationId xmlns:a16="http://schemas.microsoft.com/office/drawing/2014/main" id="{DC9F2F88-9BE4-4172-915D-6E5D229735A8}"/>
+              </a:ext>
+            </a:extLst>
+          </p:cNvPr>
+          <p:cNvSpPr/>
+          <p:nvPr/>
+        </p:nvSpPr>
+        <p:spPr>
+          <a:xfrm>
+            <a:off x="1282700" y="1422400"/>
+            <a:ext cx="1803400" cy="2260600"/>
+          </a:xfrm>
+          <a:prstGeom prst="rect">
+            <a:avLst/>
+          </a:prstGeom>
+          <a:solidFill>
+            <a:srgbClr val="214B71"/>
+          </a:solidFill>
+          <a:ln>
+            <a:noFill/>
+          </a:ln>
+        </p:spPr>
+        <p:style>
+          <a:lnRef idx="2">
+            <a:schemeClr val="accent1">
+              <a:shade val="15000"/>
+            </a:schemeClr>
+          </a:lnRef>
+          <a:fillRef idx="1">
+            <a:schemeClr val="accent1"/>
+          </a:fillRef>
+          <a:effectRef idx="0">
+            <a:schemeClr val="accent1"/>
+          </a:effectRef>
+          <a:fontRef idx="minor">
+            <a:schemeClr val="lt1"/>
+          </a:fontRef>
+        </p:style>
+        <p:txBody>
+          <a:bodyPr rtlCol="0" anchor="b"/>
+          <a:lstStyle/>
+          <a:p>
+            <a:pPr algn="ctr"/>
+            <a:r>
+              <a:rPr lang="pt-BR" dirty="0"/>
+              <a:t>#00447F</a:t>
+            </a:r>
+          </a:p>
+        </p:txBody>
+      </p:sp>
+      <p:sp>
+        <p:nvSpPr>
+          <p:cNvPr id="7" name="Rectangle 6">
+            <a:extLst>
+              <a:ext uri="{FF2B5EF4-FFF2-40B4-BE49-F238E27FC236}">
+                <a16:creationId xmlns:a16="http://schemas.microsoft.com/office/drawing/2014/main" id="{C16DA8EA-0DC5-1D26-38BC-256FBE2A513A}"/>
+              </a:ext>
+            </a:extLst>
+          </p:cNvPr>
+          <p:cNvSpPr/>
+          <p:nvPr/>
+        </p:nvSpPr>
+        <p:spPr>
+          <a:xfrm>
+            <a:off x="3263900" y="1422400"/>
+            <a:ext cx="1803400" cy="2260600"/>
+          </a:xfrm>
+          <a:prstGeom prst="rect">
+            <a:avLst/>
+          </a:prstGeom>
+          <a:solidFill>
+            <a:srgbClr val="242B38"/>
+          </a:solidFill>
+          <a:ln>
+            <a:noFill/>
+          </a:ln>
+        </p:spPr>
+        <p:style>
+          <a:lnRef idx="2">
+            <a:schemeClr val="accent1">
+              <a:shade val="15000"/>
+            </a:schemeClr>
+          </a:lnRef>
+          <a:fillRef idx="1">
+            <a:schemeClr val="accent1"/>
+          </a:fillRef>
+          <a:effectRef idx="0">
+            <a:schemeClr val="accent1"/>
+          </a:effectRef>
+          <a:fontRef idx="minor">
+            <a:schemeClr val="lt1"/>
+          </a:fontRef>
+        </p:style>
+        <p:txBody>
+          <a:bodyPr rtlCol="0" anchor="b"/>
+          <a:lstStyle/>
+          <a:p>
+            <a:pPr algn="ctr"/>
+            <a:r>
+              <a:rPr lang="pt-BR"/>
+              <a:t>#0B1A2B</a:t>
+            </a:r>
+          </a:p>
+        </p:txBody>
+      </p:sp>
+      <p:sp>
+        <p:nvSpPr>
+          <p:cNvPr id="9" name="Rectangle 8">
+            <a:extLst>
+              <a:ext uri="{FF2B5EF4-FFF2-40B4-BE49-F238E27FC236}">
+                <a16:creationId xmlns:a16="http://schemas.microsoft.com/office/drawing/2014/main" id="{1C3370C0-BBF1-479E-8D6E-4CFF159645CB}"/>
+              </a:ext>
+            </a:extLst>
+          </p:cNvPr>
+          <p:cNvSpPr/>
+          <p:nvPr/>
+        </p:nvSpPr>
+        <p:spPr>
+          <a:xfrm>
+            <a:off x="5245100" y="1422400"/>
+            <a:ext cx="1803400" cy="2260600"/>
+          </a:xfrm>
+          <a:prstGeom prst="rect">
+            <a:avLst/>
+          </a:prstGeom>
+          <a:solidFill>
+            <a:srgbClr val="D4BF90"/>
+          </a:solidFill>
+          <a:ln>
+            <a:noFill/>
+          </a:ln>
+        </p:spPr>
+        <p:style>
+          <a:lnRef idx="2">
+            <a:schemeClr val="accent1">
+              <a:shade val="15000"/>
+            </a:schemeClr>
+          </a:lnRef>
+          <a:fillRef idx="1">
+            <a:schemeClr val="accent1"/>
+          </a:fillRef>
+          <a:effectRef idx="0">
+            <a:schemeClr val="accent1"/>
+          </a:effectRef>
+          <a:fontRef idx="minor">
+            <a:schemeClr val="lt1"/>
+          </a:fontRef>
+        </p:style>
+        <p:txBody>
+          <a:bodyPr rtlCol="0" anchor="b"/>
+          <a:lstStyle/>
+          <a:p>
+            <a:pPr algn="ctr"/>
+            <a:r>
+              <a:rPr lang="pt-BR" dirty="0"/>
+              <a:t>#C6B18A</a:t>
+            </a:r>
+          </a:p>
+        </p:txBody>
+      </p:sp>
+      <p:sp>
+        <p:nvSpPr>
+          <p:cNvPr id="12" name="Rectangle 11">
+            <a:extLst>
+              <a:ext uri="{FF2B5EF4-FFF2-40B4-BE49-F238E27FC236}">
+                <a16:creationId xmlns:a16="http://schemas.microsoft.com/office/drawing/2014/main" id="{E5B155E3-4E9D-F1E8-C5DE-EB96D4696A81}"/>
+              </a:ext>
+            </a:extLst>
+          </p:cNvPr>
+          <p:cNvSpPr/>
+          <p:nvPr/>
+        </p:nvSpPr>
+        <p:spPr>
+          <a:xfrm>
+            <a:off x="7226300" y="1422400"/>
+            <a:ext cx="1803400" cy="2260600"/>
+          </a:xfrm>
+          <a:prstGeom prst="rect">
+            <a:avLst/>
+          </a:prstGeom>
+          <a:solidFill>
+            <a:srgbClr val="AD9369"/>
+          </a:solidFill>
+          <a:ln>
+            <a:noFill/>
+          </a:ln>
+        </p:spPr>
+        <p:style>
+          <a:lnRef idx="2">
+            <a:schemeClr val="accent1">
+              <a:shade val="15000"/>
+            </a:schemeClr>
+          </a:lnRef>
+          <a:fillRef idx="1">
+            <a:schemeClr val="accent1"/>
+          </a:fillRef>
+          <a:effectRef idx="0">
+            <a:schemeClr val="accent1"/>
+          </a:effectRef>
+          <a:fontRef idx="minor">
+            <a:schemeClr val="lt1"/>
+          </a:fontRef>
+        </p:style>
+        <p:txBody>
+          <a:bodyPr rtlCol="0" anchor="b"/>
+          <a:lstStyle/>
+          <a:p>
+            <a:pPr algn="ctr"/>
+            <a:r>
+              <a:rPr lang="pt-BR" dirty="0"/>
+              <a:t>#9E8A64</a:t>
+            </a:r>
+          </a:p>
+        </p:txBody>
+      </p:sp>
+      <p:sp>
+        <p:nvSpPr>
+          <p:cNvPr id="13" name="Rectangle 12">
+            <a:extLst>
+              <a:ext uri="{FF2B5EF4-FFF2-40B4-BE49-F238E27FC236}">
+                <a16:creationId xmlns:a16="http://schemas.microsoft.com/office/drawing/2014/main" id="{F2C6661E-472D-25B9-0BB2-815DA287DFED}"/>
+              </a:ext>
+            </a:extLst>
+          </p:cNvPr>
+          <p:cNvSpPr/>
+          <p:nvPr/>
+        </p:nvSpPr>
+        <p:spPr>
+          <a:xfrm>
+            <a:off x="9207500" y="1422400"/>
+            <a:ext cx="1803400" cy="2260600"/>
+          </a:xfrm>
+          <a:prstGeom prst="rect">
+            <a:avLst/>
+          </a:prstGeom>
+          <a:solidFill>
+            <a:srgbClr val="2061DF"/>
+          </a:solidFill>
+          <a:ln>
+            <a:noFill/>
+          </a:ln>
+        </p:spPr>
+        <p:style>
+          <a:lnRef idx="2">
+            <a:schemeClr val="accent1">
+              <a:shade val="15000"/>
+            </a:schemeClr>
+          </a:lnRef>
+          <a:fillRef idx="1">
+            <a:schemeClr val="accent1"/>
+          </a:fillRef>
+          <a:effectRef idx="0">
+            <a:schemeClr val="accent1"/>
+          </a:effectRef>
+          <a:fontRef idx="minor">
+            <a:schemeClr val="lt1"/>
+          </a:fontRef>
+        </p:style>
+        <p:txBody>
+          <a:bodyPr rtlCol="0" anchor="b"/>
+          <a:lstStyle/>
+          <a:p>
+            <a:pPr algn="ctr"/>
+            <a:r>
+              <a:rPr lang="pt-BR" dirty="0"/>
+              <a:t>#0129FF</a:t>
+            </a:r>
+          </a:p>
+        </p:txBody>
+      </p:sp>
+    </p:spTree>
+    <p:extLst>
+      <p:ext uri="{BB962C8B-B14F-4D97-AF65-F5344CB8AC3E}">
+        <p14:creationId xmlns:p14="http://schemas.microsoft.com/office/powerpoint/2010/main" val="762752802"/>
+      </p:ext>
+    </p:extLst>
+  </p:cSld>
+  <p:clrMapOvr>
+    <a:masterClrMapping/>
+  </p:clrMapOvr>
+</p:sld>
+</file>
+
+<file path=ppt/slides/slide8.xml><?xml version="1.0" encoding="utf-8"?>
+<p:sld xmlns:a="http://schemas.openxmlformats.org/drawingml/2006/main" xmlns:r="http://schemas.openxmlformats.org/officeDocument/2006/relationships" xmlns:p="http://schemas.openxmlformats.org/presentationml/2006/main">
+  <p:cSld>
+    <p:bg>
+      <p:bgPr>
+        <a:solidFill>
+          <a:srgbClr val="FAF8F6"/>
+        </a:solidFill>
+        <a:effectLst/>
+      </p:bgPr>
+    </p:bg>
+    <p:spTree>
+      <p:nvGrpSpPr>
+        <p:cNvPr id="1" name="">
+          <a:extLst>
+            <a:ext uri="{FF2B5EF4-FFF2-40B4-BE49-F238E27FC236}">
+              <a16:creationId xmlns:a16="http://schemas.microsoft.com/office/drawing/2014/main" id="{91160519-1D26-0819-298A-DCCCF9D2021F}"/>
+            </a:ext>
+          </a:extLst>
+        </p:cNvPr>
+        <p:cNvGrpSpPr/>
+        <p:nvPr/>
+      </p:nvGrpSpPr>
+      <p:grpSpPr>
+        <a:xfrm>
+          <a:off x="0" y="0"/>
+          <a:ext cx="0" cy="0"/>
+          <a:chOff x="0" y="0"/>
+          <a:chExt cx="0" cy="0"/>
+        </a:xfrm>
+      </p:grpSpPr>
+      <p:sp>
+        <p:nvSpPr>
+          <p:cNvPr id="2" name="Title 1">
+            <a:extLst>
+              <a:ext uri="{FF2B5EF4-FFF2-40B4-BE49-F238E27FC236}">
+                <a16:creationId xmlns:a16="http://schemas.microsoft.com/office/drawing/2014/main" id="{85A938B8-AB52-19FE-49F2-C8DD5D163DBA}"/>
+              </a:ext>
+            </a:extLst>
+          </p:cNvPr>
+          <p:cNvSpPr>
+            <a:spLocks noGrp="1"/>
+          </p:cNvSpPr>
+          <p:nvPr>
+            <p:ph type="title"/>
+          </p:nvPr>
+        </p:nvSpPr>
+        <p:spPr>
+          <a:xfrm>
+            <a:off x="913795" y="51435"/>
+            <a:ext cx="10353762" cy="1383030"/>
+          </a:xfrm>
+        </p:spPr>
+        <p:txBody>
+          <a:bodyPr/>
+          <a:lstStyle/>
+          <a:p>
+            <a:r>
+              <a:rPr lang="pt-BR" dirty="0">
+                <a:solidFill>
+                  <a:schemeClr val="bg1"/>
+                </a:solidFill>
+              </a:rPr>
+              <a:t>Logotipo</a:t>
+            </a:r>
+          </a:p>
+        </p:txBody>
+      </p:sp>
+      <p:sp>
+        <p:nvSpPr>
+          <p:cNvPr id="3" name="Content Placeholder 2">
+            <a:extLst>
+              <a:ext uri="{FF2B5EF4-FFF2-40B4-BE49-F238E27FC236}">
+                <a16:creationId xmlns:a16="http://schemas.microsoft.com/office/drawing/2014/main" id="{B076B5AA-2389-FB3A-A15E-9EE19292ED4D}"/>
+              </a:ext>
+            </a:extLst>
+          </p:cNvPr>
+          <p:cNvSpPr>
+            <a:spLocks noGrp="1"/>
+          </p:cNvSpPr>
+          <p:nvPr>
+            <p:ph idx="1"/>
+          </p:nvPr>
+        </p:nvSpPr>
+        <p:spPr>
+          <a:xfrm>
+            <a:off x="913795" y="1482726"/>
+            <a:ext cx="10353762" cy="3965574"/>
+          </a:xfrm>
+        </p:spPr>
+        <p:txBody>
+          <a:bodyPr>
+            <a:normAutofit/>
+          </a:bodyPr>
+          <a:lstStyle/>
+          <a:p>
+            <a:pPr marL="36900" indent="0">
+              <a:buNone/>
+            </a:pPr>
+            <a:r>
+              <a:rPr lang="pt-BR" dirty="0">
+                <a:solidFill>
+                  <a:schemeClr val="bg1"/>
+                </a:solidFill>
+                <a:effectLst/>
+              </a:rPr>
+              <a:t>O logotipo da ASSOGW combina o símbolo oficial da </a:t>
+            </a:r>
+            <a:r>
+              <a:rPr lang="pt-BR" dirty="0" err="1">
+                <a:solidFill>
+                  <a:schemeClr val="bg1"/>
+                </a:solidFill>
+                <a:effectLst/>
+              </a:rPr>
+              <a:t>Great</a:t>
+            </a:r>
+            <a:r>
+              <a:rPr lang="pt-BR" dirty="0">
+                <a:solidFill>
+                  <a:schemeClr val="bg1"/>
+                </a:solidFill>
+                <a:effectLst/>
+              </a:rPr>
+              <a:t> Wall Motors com a sigla da associação em uma composição horizontal equilibrada. O ‘ASSO’ aparece em azul naval, representando a solidez institucional, enquanto ‘GW’ é renderizado em dourado, criando uma distinção visual que remete à origem da marca. Abaixo, o nome completo ‘Associação de Concessionárias </a:t>
+            </a:r>
+            <a:r>
+              <a:rPr lang="pt-BR" dirty="0" err="1">
+                <a:solidFill>
+                  <a:schemeClr val="bg1"/>
+                </a:solidFill>
+                <a:effectLst/>
+              </a:rPr>
+              <a:t>Great</a:t>
+            </a:r>
+            <a:r>
+              <a:rPr lang="pt-BR" dirty="0">
+                <a:solidFill>
+                  <a:schemeClr val="bg1"/>
+                </a:solidFill>
+                <a:effectLst/>
+              </a:rPr>
+              <a:t> Wall’.</a:t>
+            </a:r>
+          </a:p>
+        </p:txBody>
+      </p:sp>
+      <p:pic>
+        <p:nvPicPr>
+          <p:cNvPr id="4" name="Picture 3" descr="A blue text on a black background&#10;&#10;AI-generated content may be incorrect.">
+            <a:extLst>
+              <a:ext uri="{FF2B5EF4-FFF2-40B4-BE49-F238E27FC236}">
+                <a16:creationId xmlns:a16="http://schemas.microsoft.com/office/drawing/2014/main" id="{AA8CEFA4-1155-7941-7A70-9F001C16ECE0}"/>
+              </a:ext>
+            </a:extLst>
+          </p:cNvPr>
+          <p:cNvPicPr>
+            <a:picLocks noChangeAspect="1"/>
+          </p:cNvPicPr>
+          <p:nvPr/>
+        </p:nvPicPr>
+        <p:blipFill>
+          <a:blip r:embed="rId2"/>
+          <a:stretch>
+            <a:fillRect/>
+          </a:stretch>
+        </p:blipFill>
+        <p:spPr>
+          <a:xfrm>
+            <a:off x="3029611" y="4416555"/>
+            <a:ext cx="6122129" cy="1323845"/>
+          </a:xfrm>
+          <a:prstGeom prst="rect">
+            <a:avLst/>
+          </a:prstGeom>
+        </p:spPr>
+      </p:pic>
+    </p:spTree>
+    <p:extLst>
+      <p:ext uri="{BB962C8B-B14F-4D97-AF65-F5344CB8AC3E}">
+        <p14:creationId xmlns:p14="http://schemas.microsoft.com/office/powerpoint/2010/main" val="1984263383"/>
+      </p:ext>
+    </p:extLst>
+  </p:cSld>
+  <p:clrMapOvr>
+    <a:masterClrMapping/>
+  </p:clrMapOvr>
+</p:sld>
+</file>
+
+<file path=ppt/slides/slide9.xml><?xml version="1.0" encoding="utf-8"?>
 <p:sld xmlns:a="http://schemas.openxmlformats.org/drawingml/2006/main" xmlns:r="http://schemas.openxmlformats.org/officeDocument/2006/relationships" xmlns:p="http://schemas.openxmlformats.org/presentationml/2006/main">
   <p:cSld>
     <p:bg>
@@ -6450,80 +8792,6 @@
     <p:extLst>
       <p:ext uri="{BB962C8B-B14F-4D97-AF65-F5344CB8AC3E}">
         <p14:creationId xmlns:p14="http://schemas.microsoft.com/office/powerpoint/2010/main" val="158128671"/>
-      </p:ext>
-    </p:extLst>
-  </p:cSld>
-  <p:clrMapOvr>
-    <a:masterClrMapping/>
-  </p:clrMapOvr>
-</p:sld>
-</file>
-
-<file path=ppt/slides/slide3.xml><?xml version="1.0" encoding="utf-8"?>
-<p:sld xmlns:a="http://schemas.openxmlformats.org/drawingml/2006/main" xmlns:r="http://schemas.openxmlformats.org/officeDocument/2006/relationships" xmlns:p="http://schemas.openxmlformats.org/presentationml/2006/main">
-  <p:cSld>
-    <p:bg>
-      <p:bgPr>
-        <a:solidFill>
-          <a:srgbClr val="FAF8F6"/>
-        </a:solidFill>
-        <a:effectLst/>
-      </p:bgPr>
-    </p:bg>
-    <p:spTree>
-      <p:nvGrpSpPr>
-        <p:cNvPr id="1" name="">
-          <a:extLst>
-            <a:ext uri="{FF2B5EF4-FFF2-40B4-BE49-F238E27FC236}">
-              <a16:creationId xmlns:a16="http://schemas.microsoft.com/office/drawing/2014/main" id="{1A691090-2C9B-5DA3-5F16-D1F206548917}"/>
-            </a:ext>
-          </a:extLst>
-        </p:cNvPr>
-        <p:cNvGrpSpPr/>
-        <p:nvPr/>
-      </p:nvGrpSpPr>
-      <p:grpSpPr>
-        <a:xfrm>
-          <a:off x="0" y="0"/>
-          <a:ext cx="0" cy="0"/>
-          <a:chOff x="0" y="0"/>
-          <a:chExt cx="0" cy="0"/>
-        </a:xfrm>
-      </p:grpSpPr>
-      <p:pic>
-        <p:nvPicPr>
-          <p:cNvPr id="10" name="Picture 9" descr="A group of different colors of different shades of blue brown black and white&#10;&#10;AI-generated content may be incorrect.">
-            <a:extLst>
-              <a:ext uri="{FF2B5EF4-FFF2-40B4-BE49-F238E27FC236}">
-                <a16:creationId xmlns:a16="http://schemas.microsoft.com/office/drawing/2014/main" id="{F28A58EA-3442-35A3-8838-85471CD273BF}"/>
-              </a:ext>
-            </a:extLst>
-          </p:cNvPr>
-          <p:cNvPicPr>
-            <a:picLocks noChangeAspect="1"/>
-          </p:cNvPicPr>
-          <p:nvPr/>
-        </p:nvPicPr>
-        <p:blipFill>
-          <a:blip r:embed="rId2"/>
-          <a:stretch>
-            <a:fillRect/>
-          </a:stretch>
-        </p:blipFill>
-        <p:spPr>
-          <a:xfrm>
-            <a:off x="952500" y="0"/>
-            <a:ext cx="10287000" cy="6858000"/>
-          </a:xfrm>
-          <a:prstGeom prst="rect">
-            <a:avLst/>
-          </a:prstGeom>
-        </p:spPr>
-      </p:pic>
-    </p:spTree>
-    <p:extLst>
-      <p:ext uri="{BB962C8B-B14F-4D97-AF65-F5344CB8AC3E}">
-        <p14:creationId xmlns:p14="http://schemas.microsoft.com/office/powerpoint/2010/main" val="977664227"/>
       </p:ext>
     </p:extLst>
   </p:cSld>
@@ -7281,6 +9549,15 @@
 </file>
 
 <file path=customXml/item2.xml><?xml version="1.0" encoding="utf-8"?>
+<p:properties xmlns:p="http://schemas.microsoft.com/office/2006/metadata/properties" xmlns:xsi="http://www.w3.org/2001/XMLSchema-instance" xmlns:pc="http://schemas.microsoft.com/office/infopath/2007/PartnerControls">
+  <documentManagement>
+    <Status xmlns="71af3243-3dd4-4a8d-8c0d-dd76da1f02a5">Not started</Status>
+    <MediaServiceKeyPoints xmlns="71af3243-3dd4-4a8d-8c0d-dd76da1f02a5" xsi:nil="true"/>
+  </documentManagement>
+</p:properties>
+</file>
+
+<file path=customXml/item3.xml><?xml version="1.0" encoding="utf-8"?>
 <ct:contentTypeSchema xmlns:ct="http://schemas.microsoft.com/office/2006/metadata/contentType" xmlns:ma="http://schemas.microsoft.com/office/2006/metadata/properties/metaAttributes" ct:_="" ma:_="" ma:contentTypeName="Document" ma:contentTypeID="0x01010079F111ED35F8CC479449609E8A0923A6" ma:contentTypeVersion="12" ma:contentTypeDescription="Create a new document." ma:contentTypeScope="" ma:versionID="a410dd7f93c95333ffa1b60ed6adedd1">
   <xsd:schema xmlns:xsd="http://www.w3.org/2001/XMLSchema" xmlns:xs="http://www.w3.org/2001/XMLSchema" xmlns:p="http://schemas.microsoft.com/office/2006/metadata/properties" xmlns:ns2="71af3243-3dd4-4a8d-8c0d-dd76da1f02a5" xmlns:ns3="16c05727-aa75-4e4a-9b5f-8a80a1165891" targetNamespace="http://schemas.microsoft.com/office/2006/metadata/properties" ma:root="true" ma:fieldsID="a936d9baba76aa3866493feff160faab" ns2:_="" ns3:_="">
     <xsd:import namespace="71af3243-3dd4-4a8d-8c0d-dd76da1f02a5"/>
@@ -7501,15 +9778,6 @@
 </ct:contentTypeSchema>
 </file>
 
-<file path=customXml/item3.xml><?xml version="1.0" encoding="utf-8"?>
-<p:properties xmlns:p="http://schemas.microsoft.com/office/2006/metadata/properties" xmlns:xsi="http://www.w3.org/2001/XMLSchema-instance" xmlns:pc="http://schemas.microsoft.com/office/infopath/2007/PartnerControls">
-  <documentManagement>
-    <Status xmlns="71af3243-3dd4-4a8d-8c0d-dd76da1f02a5">Not started</Status>
-    <MediaServiceKeyPoints xmlns="71af3243-3dd4-4a8d-8c0d-dd76da1f02a5" xsi:nil="true"/>
-  </documentManagement>
-</p:properties>
-</file>
-
 <file path=customXml/itemProps1.xml><?xml version="1.0" encoding="utf-8"?>
 <ds:datastoreItem xmlns:ds="http://schemas.openxmlformats.org/officeDocument/2006/customXml" ds:itemID="{64B270AB-C138-415C-897E-3C24487DECF1}">
   <ds:schemaRefs>
@@ -7519,6 +9787,23 @@
 </file>
 
 <file path=customXml/itemProps2.xml><?xml version="1.0" encoding="utf-8"?>
+<ds:datastoreItem xmlns:ds="http://schemas.openxmlformats.org/officeDocument/2006/customXml" ds:itemID="{2C4C00F4-06E9-43E3-AD97-88A857CEFA82}">
+  <ds:schemaRefs>
+    <ds:schemaRef ds:uri="http://purl.org/dc/dcmitype/"/>
+    <ds:schemaRef ds:uri="http://www.w3.org/XML/1998/namespace"/>
+    <ds:schemaRef ds:uri="http://schemas.microsoft.com/office/2006/documentManagement/types"/>
+    <ds:schemaRef ds:uri="http://schemas.microsoft.com/office/2006/metadata/properties"/>
+    <ds:schemaRef ds:uri="http://schemas.microsoft.com/office/infopath/2007/PartnerControls"/>
+    <ds:schemaRef ds:uri="http://schemas.openxmlformats.org/package/2006/metadata/core-properties"/>
+    <ds:schemaRef ds:uri="http://purl.org/dc/terms/"/>
+    <ds:schemaRef ds:uri="http://purl.org/dc/elements/1.1/"/>
+    <ds:schemaRef ds:uri="16c05727-aa75-4e4a-9b5f-8a80a1165891"/>
+    <ds:schemaRef ds:uri="71af3243-3dd4-4a8d-8c0d-dd76da1f02a5"/>
+  </ds:schemaRefs>
+</ds:datastoreItem>
+</file>
+
+<file path=customXml/itemProps3.xml><?xml version="1.0" encoding="utf-8"?>
 <ds:datastoreItem xmlns:ds="http://schemas.openxmlformats.org/officeDocument/2006/customXml" ds:itemID="{0585E981-8C91-4205-A0C3-C991F42B4C9E}">
   <ds:schemaRefs>
     <ds:schemaRef ds:uri="http://schemas.microsoft.com/office/2006/metadata/contentType"/>
@@ -7535,14 +9820,4 @@
     <ds:schemaRef ds:uri="http://schemas.microsoft.com/internal/obd"/>
   </ds:schemaRefs>
 </ds:datastoreItem>
-</file>
-
-<file path=customXml/itemProps3.xml><?xml version="1.0" encoding="utf-8"?>
-<ds:datastoreItem xmlns:ds="http://schemas.openxmlformats.org/officeDocument/2006/customXml" ds:itemID="{2C4C00F4-06E9-43E3-AD97-88A857CEFA82}">
-  <ds:schemaRefs>
-    <ds:schemaRef ds:uri="http://schemas.microsoft.com/office/2006/metadata/properties"/>
-    <ds:schemaRef ds:uri="http://schemas.microsoft.com/office/infopath/2007/PartnerControls"/>
-    <ds:schemaRef ds:uri="71af3243-3dd4-4a8d-8c0d-dd76da1f02a5"/>
-  </ds:schemaRefs>
-</ds:datastoreItem>
 </file>
</xml_diff>